<commit_message>
Updates to AI group
Added a log-loss slide to the back up slides in case they ask. Switched the 4 brackets to the right side of the page so I could make them bigger, and added "appear" animation to slides with too many words so it was easier to present.
</commit_message>
<xml_diff>
--- a/AIGroupPresentation.pptx
+++ b/AIGroupPresentation.pptx
@@ -5,7 +5,7 @@
     <p:sldMasterId id="2147483659" r:id="rId1"/>
   </p:sldMasterIdLst>
   <p:notesMasterIdLst>
-    <p:notesMasterId r:id="rId34"/>
+    <p:notesMasterId r:id="rId35"/>
   </p:notesMasterIdLst>
   <p:sldIdLst>
     <p:sldId id="256" r:id="rId2"/>
@@ -31,15 +31,16 @@
     <p:sldId id="276" r:id="rId22"/>
     <p:sldId id="277" r:id="rId23"/>
     <p:sldId id="278" r:id="rId24"/>
-    <p:sldId id="279" r:id="rId25"/>
-    <p:sldId id="280" r:id="rId26"/>
-    <p:sldId id="281" r:id="rId27"/>
-    <p:sldId id="282" r:id="rId28"/>
-    <p:sldId id="283" r:id="rId29"/>
-    <p:sldId id="284" r:id="rId30"/>
-    <p:sldId id="285" r:id="rId31"/>
-    <p:sldId id="286" r:id="rId32"/>
-    <p:sldId id="287" r:id="rId33"/>
+    <p:sldId id="289" r:id="rId25"/>
+    <p:sldId id="288" r:id="rId26"/>
+    <p:sldId id="280" r:id="rId27"/>
+    <p:sldId id="281" r:id="rId28"/>
+    <p:sldId id="282" r:id="rId29"/>
+    <p:sldId id="283" r:id="rId30"/>
+    <p:sldId id="284" r:id="rId31"/>
+    <p:sldId id="285" r:id="rId32"/>
+    <p:sldId id="286" r:id="rId33"/>
+    <p:sldId id="287" r:id="rId34"/>
   </p:sldIdLst>
   <p:sldSz cx="12192000" cy="6858000"/>
   <p:notesSz cx="6946900" cy="9220200"/>
@@ -2155,6 +2156,110 @@
   <p:cSld>
     <p:spTree>
       <p:nvGrpSpPr>
+        <p:cNvPr id="1" name="Shape 203"/>
+        <p:cNvGrpSpPr/>
+        <p:nvPr/>
+      </p:nvGrpSpPr>
+      <p:grpSpPr>
+        <a:xfrm>
+          <a:off x="0" y="0"/>
+          <a:ext cx="0" cy="0"/>
+          <a:chOff x="0" y="0"/>
+          <a:chExt cx="0" cy="0"/>
+        </a:xfrm>
+      </p:grpSpPr>
+      <p:sp>
+        <p:nvSpPr>
+          <p:cNvPr id="204" name="Shape 204"/>
+          <p:cNvSpPr txBox="1">
+            <a:spLocks noGrp="1"/>
+          </p:cNvSpPr>
+          <p:nvPr>
+            <p:ph type="body" idx="1"/>
+          </p:nvPr>
+        </p:nvSpPr>
+        <p:spPr>
+          <a:xfrm>
+            <a:off x="694690" y="4379595"/>
+            <a:ext cx="5557520" cy="4149090"/>
+          </a:xfrm>
+          <a:prstGeom prst="rect">
+            <a:avLst/>
+          </a:prstGeom>
+          <a:noFill/>
+          <a:ln>
+            <a:noFill/>
+          </a:ln>
+        </p:spPr>
+        <p:txBody>
+          <a:bodyPr lIns="92367" tIns="92367" rIns="92367" bIns="92367" anchor="ctr" anchorCtr="0">
+            <a:noAutofit/>
+          </a:bodyPr>
+          <a:lstStyle/>
+          <a:p>
+            <a:endParaRPr dirty="0"/>
+          </a:p>
+        </p:txBody>
+      </p:sp>
+      <p:sp>
+        <p:nvSpPr>
+          <p:cNvPr id="205" name="Shape 205"/>
+          <p:cNvSpPr>
+            <a:spLocks noGrp="1" noRot="1" noChangeAspect="1"/>
+          </p:cNvSpPr>
+          <p:nvPr>
+            <p:ph type="sldImg" idx="2"/>
+          </p:nvPr>
+        </p:nvSpPr>
+        <p:spPr>
+          <a:xfrm>
+            <a:off x="400050" y="692150"/>
+            <a:ext cx="6146800" cy="3457575"/>
+          </a:xfrm>
+          <a:custGeom>
+            <a:avLst/>
+            <a:gdLst/>
+            <a:ahLst/>
+            <a:cxnLst/>
+            <a:rect l="0" t="0" r="0" b="0"/>
+            <a:pathLst>
+              <a:path w="120000" h="120000" extrusionOk="0">
+                <a:moveTo>
+                  <a:pt x="0" y="0"/>
+                </a:moveTo>
+                <a:lnTo>
+                  <a:pt x="120000" y="0"/>
+                </a:lnTo>
+                <a:lnTo>
+                  <a:pt x="120000" y="120000"/>
+                </a:lnTo>
+                <a:lnTo>
+                  <a:pt x="0" y="120000"/>
+                </a:lnTo>
+                <a:close/>
+              </a:path>
+            </a:pathLst>
+          </a:custGeom>
+        </p:spPr>
+      </p:sp>
+    </p:spTree>
+    <p:extLst>
+      <p:ext uri="{BB962C8B-B14F-4D97-AF65-F5344CB8AC3E}">
+        <p14:creationId xmlns:p14="http://schemas.microsoft.com/office/powerpoint/2010/main" val="3150013310"/>
+      </p:ext>
+    </p:extLst>
+  </p:cSld>
+  <p:clrMapOvr>
+    <a:masterClrMapping/>
+  </p:clrMapOvr>
+</p:notes>
+</file>
+
+<file path=ppt/notesSlides/notesSlide25.xml><?xml version="1.0" encoding="utf-8"?>
+<p:notes xmlns:a="http://schemas.openxmlformats.org/drawingml/2006/main" xmlns:r="http://schemas.openxmlformats.org/officeDocument/2006/relationships" xmlns:p="http://schemas.openxmlformats.org/presentationml/2006/main" showMasterSp="0" showMasterPhAnim="0">
+  <p:cSld>
+    <p:spTree>
+      <p:nvGrpSpPr>
         <p:cNvPr id="1" name="Shape 219"/>
         <p:cNvGrpSpPr/>
         <p:nvPr/>
@@ -2254,7 +2359,7 @@
 </p:notes>
 </file>
 
-<file path=ppt/notesSlides/notesSlide25.xml><?xml version="1.0" encoding="utf-8"?>
+<file path=ppt/notesSlides/notesSlide26.xml><?xml version="1.0" encoding="utf-8"?>
 <p:notes xmlns:a="http://schemas.openxmlformats.org/drawingml/2006/main" xmlns:r="http://schemas.openxmlformats.org/officeDocument/2006/relationships" xmlns:p="http://schemas.openxmlformats.org/presentationml/2006/main" showMasterSp="0" showMasterPhAnim="0">
   <p:cSld>
     <p:spTree>
@@ -2358,7 +2463,7 @@
 </p:notes>
 </file>
 
-<file path=ppt/notesSlides/notesSlide26.xml><?xml version="1.0" encoding="utf-8"?>
+<file path=ppt/notesSlides/notesSlide27.xml><?xml version="1.0" encoding="utf-8"?>
 <p:notes xmlns:a="http://schemas.openxmlformats.org/drawingml/2006/main" xmlns:r="http://schemas.openxmlformats.org/officeDocument/2006/relationships" xmlns:p="http://schemas.openxmlformats.org/presentationml/2006/main" showMasterSp="0" showMasterPhAnim="0">
   <p:cSld>
     <p:spTree>
@@ -2462,7 +2567,7 @@
 </p:notes>
 </file>
 
-<file path=ppt/notesSlides/notesSlide27.xml><?xml version="1.0" encoding="utf-8"?>
+<file path=ppt/notesSlides/notesSlide28.xml><?xml version="1.0" encoding="utf-8"?>
 <p:notes xmlns:a="http://schemas.openxmlformats.org/drawingml/2006/main" xmlns:r="http://schemas.openxmlformats.org/officeDocument/2006/relationships" xmlns:p="http://schemas.openxmlformats.org/presentationml/2006/main" showMasterSp="0" showMasterPhAnim="0">
   <p:cSld>
     <p:spTree>
@@ -2566,7 +2671,7 @@
 </p:notes>
 </file>
 
-<file path=ppt/notesSlides/notesSlide28.xml><?xml version="1.0" encoding="utf-8"?>
+<file path=ppt/notesSlides/notesSlide29.xml><?xml version="1.0" encoding="utf-8"?>
 <p:notes xmlns:a="http://schemas.openxmlformats.org/drawingml/2006/main" xmlns:r="http://schemas.openxmlformats.org/officeDocument/2006/relationships" xmlns:p="http://schemas.openxmlformats.org/presentationml/2006/main" showMasterSp="0" showMasterPhAnim="0">
   <p:cSld>
     <p:spTree>
@@ -2661,110 +2766,6 @@
     <p:extLst>
       <p:ext uri="{BB962C8B-B14F-4D97-AF65-F5344CB8AC3E}">
         <p14:creationId xmlns:p14="http://schemas.microsoft.com/office/powerpoint/2010/main" val="2871586868"/>
-      </p:ext>
-    </p:extLst>
-  </p:cSld>
-  <p:clrMapOvr>
-    <a:masterClrMapping/>
-  </p:clrMapOvr>
-</p:notes>
-</file>
-
-<file path=ppt/notesSlides/notesSlide29.xml><?xml version="1.0" encoding="utf-8"?>
-<p:notes xmlns:a="http://schemas.openxmlformats.org/drawingml/2006/main" xmlns:r="http://schemas.openxmlformats.org/officeDocument/2006/relationships" xmlns:p="http://schemas.openxmlformats.org/presentationml/2006/main" showMasterSp="0" showMasterPhAnim="0">
-  <p:cSld>
-    <p:spTree>
-      <p:nvGrpSpPr>
-        <p:cNvPr id="1" name="Shape 249"/>
-        <p:cNvGrpSpPr/>
-        <p:nvPr/>
-      </p:nvGrpSpPr>
-      <p:grpSpPr>
-        <a:xfrm>
-          <a:off x="0" y="0"/>
-          <a:ext cx="0" cy="0"/>
-          <a:chOff x="0" y="0"/>
-          <a:chExt cx="0" cy="0"/>
-        </a:xfrm>
-      </p:grpSpPr>
-      <p:sp>
-        <p:nvSpPr>
-          <p:cNvPr id="250" name="Shape 250"/>
-          <p:cNvSpPr txBox="1">
-            <a:spLocks noGrp="1"/>
-          </p:cNvSpPr>
-          <p:nvPr>
-            <p:ph type="body" idx="1"/>
-          </p:nvPr>
-        </p:nvSpPr>
-        <p:spPr>
-          <a:xfrm>
-            <a:off x="694690" y="4379595"/>
-            <a:ext cx="5557520" cy="4149090"/>
-          </a:xfrm>
-          <a:prstGeom prst="rect">
-            <a:avLst/>
-          </a:prstGeom>
-          <a:noFill/>
-          <a:ln>
-            <a:noFill/>
-          </a:ln>
-        </p:spPr>
-        <p:txBody>
-          <a:bodyPr lIns="92367" tIns="92367" rIns="92367" bIns="92367" anchor="ctr" anchorCtr="0">
-            <a:noAutofit/>
-          </a:bodyPr>
-          <a:lstStyle/>
-          <a:p>
-            <a:endParaRPr dirty="0"/>
-          </a:p>
-        </p:txBody>
-      </p:sp>
-      <p:sp>
-        <p:nvSpPr>
-          <p:cNvPr id="251" name="Shape 251"/>
-          <p:cNvSpPr>
-            <a:spLocks noGrp="1" noRot="1" noChangeAspect="1"/>
-          </p:cNvSpPr>
-          <p:nvPr>
-            <p:ph type="sldImg" idx="2"/>
-          </p:nvPr>
-        </p:nvSpPr>
-        <p:spPr>
-          <a:xfrm>
-            <a:off x="400050" y="692150"/>
-            <a:ext cx="6146800" cy="3457575"/>
-          </a:xfrm>
-          <a:custGeom>
-            <a:avLst/>
-            <a:gdLst/>
-            <a:ahLst/>
-            <a:cxnLst/>
-            <a:rect l="0" t="0" r="0" b="0"/>
-            <a:pathLst>
-              <a:path w="120000" h="120000" extrusionOk="0">
-                <a:moveTo>
-                  <a:pt x="0" y="0"/>
-                </a:moveTo>
-                <a:lnTo>
-                  <a:pt x="120000" y="0"/>
-                </a:lnTo>
-                <a:lnTo>
-                  <a:pt x="120000" y="120000"/>
-                </a:lnTo>
-                <a:lnTo>
-                  <a:pt x="0" y="120000"/>
-                </a:lnTo>
-                <a:close/>
-              </a:path>
-            </a:pathLst>
-          </a:custGeom>
-        </p:spPr>
-      </p:sp>
-    </p:spTree>
-    <p:extLst>
-      <p:ext uri="{BB962C8B-B14F-4D97-AF65-F5344CB8AC3E}">
-        <p14:creationId xmlns:p14="http://schemas.microsoft.com/office/powerpoint/2010/main" val="2919921175"/>
       </p:ext>
     </p:extLst>
   </p:cSld>
@@ -2883,6 +2884,110 @@
   <p:cSld>
     <p:spTree>
       <p:nvGrpSpPr>
+        <p:cNvPr id="1" name="Shape 249"/>
+        <p:cNvGrpSpPr/>
+        <p:nvPr/>
+      </p:nvGrpSpPr>
+      <p:grpSpPr>
+        <a:xfrm>
+          <a:off x="0" y="0"/>
+          <a:ext cx="0" cy="0"/>
+          <a:chOff x="0" y="0"/>
+          <a:chExt cx="0" cy="0"/>
+        </a:xfrm>
+      </p:grpSpPr>
+      <p:sp>
+        <p:nvSpPr>
+          <p:cNvPr id="250" name="Shape 250"/>
+          <p:cNvSpPr txBox="1">
+            <a:spLocks noGrp="1"/>
+          </p:cNvSpPr>
+          <p:nvPr>
+            <p:ph type="body" idx="1"/>
+          </p:nvPr>
+        </p:nvSpPr>
+        <p:spPr>
+          <a:xfrm>
+            <a:off x="694690" y="4379595"/>
+            <a:ext cx="5557520" cy="4149090"/>
+          </a:xfrm>
+          <a:prstGeom prst="rect">
+            <a:avLst/>
+          </a:prstGeom>
+          <a:noFill/>
+          <a:ln>
+            <a:noFill/>
+          </a:ln>
+        </p:spPr>
+        <p:txBody>
+          <a:bodyPr lIns="92367" tIns="92367" rIns="92367" bIns="92367" anchor="ctr" anchorCtr="0">
+            <a:noAutofit/>
+          </a:bodyPr>
+          <a:lstStyle/>
+          <a:p>
+            <a:endParaRPr dirty="0"/>
+          </a:p>
+        </p:txBody>
+      </p:sp>
+      <p:sp>
+        <p:nvSpPr>
+          <p:cNvPr id="251" name="Shape 251"/>
+          <p:cNvSpPr>
+            <a:spLocks noGrp="1" noRot="1" noChangeAspect="1"/>
+          </p:cNvSpPr>
+          <p:nvPr>
+            <p:ph type="sldImg" idx="2"/>
+          </p:nvPr>
+        </p:nvSpPr>
+        <p:spPr>
+          <a:xfrm>
+            <a:off x="400050" y="692150"/>
+            <a:ext cx="6146800" cy="3457575"/>
+          </a:xfrm>
+          <a:custGeom>
+            <a:avLst/>
+            <a:gdLst/>
+            <a:ahLst/>
+            <a:cxnLst/>
+            <a:rect l="0" t="0" r="0" b="0"/>
+            <a:pathLst>
+              <a:path w="120000" h="120000" extrusionOk="0">
+                <a:moveTo>
+                  <a:pt x="0" y="0"/>
+                </a:moveTo>
+                <a:lnTo>
+                  <a:pt x="120000" y="0"/>
+                </a:lnTo>
+                <a:lnTo>
+                  <a:pt x="120000" y="120000"/>
+                </a:lnTo>
+                <a:lnTo>
+                  <a:pt x="0" y="120000"/>
+                </a:lnTo>
+                <a:close/>
+              </a:path>
+            </a:pathLst>
+          </a:custGeom>
+        </p:spPr>
+      </p:sp>
+    </p:spTree>
+    <p:extLst>
+      <p:ext uri="{BB962C8B-B14F-4D97-AF65-F5344CB8AC3E}">
+        <p14:creationId xmlns:p14="http://schemas.microsoft.com/office/powerpoint/2010/main" val="2919921175"/>
+      </p:ext>
+    </p:extLst>
+  </p:cSld>
+  <p:clrMapOvr>
+    <a:masterClrMapping/>
+  </p:clrMapOvr>
+</p:notes>
+</file>
+
+<file path=ppt/notesSlides/notesSlide31.xml><?xml version="1.0" encoding="utf-8"?>
+<p:notes xmlns:a="http://schemas.openxmlformats.org/drawingml/2006/main" xmlns:r="http://schemas.openxmlformats.org/officeDocument/2006/relationships" xmlns:p="http://schemas.openxmlformats.org/presentationml/2006/main" showMasterSp="0" showMasterPhAnim="0">
+  <p:cSld>
+    <p:spTree>
+      <p:nvGrpSpPr>
         <p:cNvPr id="1" name="Shape 255"/>
         <p:cNvGrpSpPr/>
         <p:nvPr/>
@@ -2982,7 +3087,7 @@
 </p:notes>
 </file>
 
-<file path=ppt/notesSlides/notesSlide31.xml><?xml version="1.0" encoding="utf-8"?>
+<file path=ppt/notesSlides/notesSlide32.xml><?xml version="1.0" encoding="utf-8"?>
 <p:notes xmlns:a="http://schemas.openxmlformats.org/drawingml/2006/main" xmlns:r="http://schemas.openxmlformats.org/officeDocument/2006/relationships" xmlns:p="http://schemas.openxmlformats.org/presentationml/2006/main" showMasterSp="0" showMasterPhAnim="0">
   <p:cSld>
     <p:spTree>
@@ -3082,7 +3187,7 @@
 </p:notes>
 </file>
 
-<file path=ppt/notesSlides/notesSlide32.xml><?xml version="1.0" encoding="utf-8"?>
+<file path=ppt/notesSlides/notesSlide33.xml><?xml version="1.0" encoding="utf-8"?>
 <p:notes xmlns:a="http://schemas.openxmlformats.org/drawingml/2006/main" xmlns:r="http://schemas.openxmlformats.org/officeDocument/2006/relationships" xmlns:p="http://schemas.openxmlformats.org/presentationml/2006/main" showMasterSp="0" showMasterPhAnim="0">
   <p:cSld>
     <p:spTree>
@@ -14476,6 +14581,13 @@
   <p:clrMapOvr>
     <a:masterClrMapping/>
   </p:clrMapOvr>
+  <p:timing>
+    <p:tnLst>
+      <p:par>
+        <p:cTn id="1" dur="indefinite" restart="never" nodeType="tmRoot"/>
+      </p:par>
+    </p:tnLst>
+  </p:timing>
 </p:sld>
 </file>
 
@@ -14770,6 +14882,183 @@
   <p:clrMapOvr>
     <a:masterClrMapping/>
   </p:clrMapOvr>
+  <p:timing>
+    <p:tnLst>
+      <p:par>
+        <p:cTn id="1" dur="indefinite" restart="never" nodeType="tmRoot">
+          <p:childTnLst>
+            <p:seq concurrent="1" nextAc="seek">
+              <p:cTn id="2" dur="indefinite" nodeType="mainSeq">
+                <p:childTnLst>
+                  <p:par>
+                    <p:cTn id="3" fill="hold">
+                      <p:stCondLst>
+                        <p:cond delay="indefinite"/>
+                      </p:stCondLst>
+                      <p:childTnLst>
+                        <p:par>
+                          <p:cTn id="4" fill="hold">
+                            <p:stCondLst>
+                              <p:cond delay="0"/>
+                            </p:stCondLst>
+                            <p:childTnLst>
+                              <p:par>
+                                <p:cTn id="5" presetID="1" presetClass="entr" presetSubtype="0" fill="hold" nodeType="clickEffect">
+                                  <p:stCondLst>
+                                    <p:cond delay="0"/>
+                                  </p:stCondLst>
+                                  <p:childTnLst>
+                                    <p:set>
+                                      <p:cBhvr>
+                                        <p:cTn id="6" dur="1" fill="hold">
+                                          <p:stCondLst>
+                                            <p:cond delay="0"/>
+                                          </p:stCondLst>
+                                        </p:cTn>
+                                        <p:tgtEl>
+                                          <p:spTgt spid="138">
+                                            <p:txEl>
+                                              <p:pRg st="2" end="2"/>
+                                            </p:txEl>
+                                          </p:spTgt>
+                                        </p:tgtEl>
+                                        <p:attrNameLst>
+                                          <p:attrName>style.visibility</p:attrName>
+                                        </p:attrNameLst>
+                                      </p:cBhvr>
+                                      <p:to>
+                                        <p:strVal val="visible"/>
+                                      </p:to>
+                                    </p:set>
+                                  </p:childTnLst>
+                                </p:cTn>
+                              </p:par>
+                            </p:childTnLst>
+                          </p:cTn>
+                        </p:par>
+                      </p:childTnLst>
+                    </p:cTn>
+                  </p:par>
+                  <p:par>
+                    <p:cTn id="7" fill="hold">
+                      <p:stCondLst>
+                        <p:cond delay="indefinite"/>
+                      </p:stCondLst>
+                      <p:childTnLst>
+                        <p:par>
+                          <p:cTn id="8" fill="hold">
+                            <p:stCondLst>
+                              <p:cond delay="0"/>
+                            </p:stCondLst>
+                            <p:childTnLst>
+                              <p:par>
+                                <p:cTn id="9" presetID="1" presetClass="entr" presetSubtype="0" fill="hold" nodeType="clickEffect">
+                                  <p:stCondLst>
+                                    <p:cond delay="0"/>
+                                  </p:stCondLst>
+                                  <p:childTnLst>
+                                    <p:set>
+                                      <p:cBhvr>
+                                        <p:cTn id="10" dur="1" fill="hold">
+                                          <p:stCondLst>
+                                            <p:cond delay="0"/>
+                                          </p:stCondLst>
+                                        </p:cTn>
+                                        <p:tgtEl>
+                                          <p:spTgt spid="138">
+                                            <p:txEl>
+                                              <p:pRg st="4" end="4"/>
+                                            </p:txEl>
+                                          </p:spTgt>
+                                        </p:tgtEl>
+                                        <p:attrNameLst>
+                                          <p:attrName>style.visibility</p:attrName>
+                                        </p:attrNameLst>
+                                      </p:cBhvr>
+                                      <p:to>
+                                        <p:strVal val="visible"/>
+                                      </p:to>
+                                    </p:set>
+                                  </p:childTnLst>
+                                </p:cTn>
+                              </p:par>
+                            </p:childTnLst>
+                          </p:cTn>
+                        </p:par>
+                      </p:childTnLst>
+                    </p:cTn>
+                  </p:par>
+                  <p:par>
+                    <p:cTn id="11" fill="hold">
+                      <p:stCondLst>
+                        <p:cond delay="indefinite"/>
+                      </p:stCondLst>
+                      <p:childTnLst>
+                        <p:par>
+                          <p:cTn id="12" fill="hold">
+                            <p:stCondLst>
+                              <p:cond delay="0"/>
+                            </p:stCondLst>
+                            <p:childTnLst>
+                              <p:par>
+                                <p:cTn id="13" presetID="1" presetClass="entr" presetSubtype="0" fill="hold" nodeType="clickEffect">
+                                  <p:stCondLst>
+                                    <p:cond delay="0"/>
+                                  </p:stCondLst>
+                                  <p:childTnLst>
+                                    <p:set>
+                                      <p:cBhvr>
+                                        <p:cTn id="14" dur="1" fill="hold">
+                                          <p:stCondLst>
+                                            <p:cond delay="0"/>
+                                          </p:stCondLst>
+                                        </p:cTn>
+                                        <p:tgtEl>
+                                          <p:spTgt spid="138">
+                                            <p:txEl>
+                                              <p:pRg st="6" end="6"/>
+                                            </p:txEl>
+                                          </p:spTgt>
+                                        </p:tgtEl>
+                                        <p:attrNameLst>
+                                          <p:attrName>style.visibility</p:attrName>
+                                        </p:attrNameLst>
+                                      </p:cBhvr>
+                                      <p:to>
+                                        <p:strVal val="visible"/>
+                                      </p:to>
+                                    </p:set>
+                                  </p:childTnLst>
+                                </p:cTn>
+                              </p:par>
+                            </p:childTnLst>
+                          </p:cTn>
+                        </p:par>
+                      </p:childTnLst>
+                    </p:cTn>
+                  </p:par>
+                </p:childTnLst>
+              </p:cTn>
+              <p:prevCondLst>
+                <p:cond evt="onPrev" delay="0">
+                  <p:tgtEl>
+                    <p:sldTgt/>
+                  </p:tgtEl>
+                </p:cond>
+              </p:prevCondLst>
+              <p:nextCondLst>
+                <p:cond evt="onNext" delay="0">
+                  <p:tgtEl>
+                    <p:sldTgt/>
+                  </p:tgtEl>
+                </p:cond>
+              </p:nextCondLst>
+            </p:seq>
+          </p:childTnLst>
+        </p:cTn>
+      </p:par>
+    </p:tnLst>
+  </p:timing>
 </p:sld>
 </file>
 
@@ -15020,6 +15309,134 @@
   <p:clrMapOvr>
     <a:masterClrMapping/>
   </p:clrMapOvr>
+  <p:timing>
+    <p:tnLst>
+      <p:par>
+        <p:cTn id="1" dur="indefinite" restart="never" nodeType="tmRoot">
+          <p:childTnLst>
+            <p:seq concurrent="1" nextAc="seek">
+              <p:cTn id="2" dur="indefinite" nodeType="mainSeq">
+                <p:childTnLst>
+                  <p:par>
+                    <p:cTn id="3" fill="hold">
+                      <p:stCondLst>
+                        <p:cond delay="indefinite"/>
+                      </p:stCondLst>
+                      <p:childTnLst>
+                        <p:par>
+                          <p:cTn id="4" fill="hold">
+                            <p:stCondLst>
+                              <p:cond delay="0"/>
+                            </p:stCondLst>
+                            <p:childTnLst>
+                              <p:par>
+                                <p:cTn id="5" presetID="1" presetClass="entr" presetSubtype="0" fill="hold" nodeType="clickEffect">
+                                  <p:stCondLst>
+                                    <p:cond delay="0"/>
+                                  </p:stCondLst>
+                                  <p:childTnLst>
+                                    <p:set>
+                                      <p:cBhvr>
+                                        <p:cTn id="6" dur="1" fill="hold">
+                                          <p:stCondLst>
+                                            <p:cond delay="0"/>
+                                          </p:stCondLst>
+                                        </p:cTn>
+                                        <p:tgtEl>
+                                          <p:spTgt spid="144">
+                                            <p:txEl>
+                                              <p:pRg st="2" end="2"/>
+                                            </p:txEl>
+                                          </p:spTgt>
+                                        </p:tgtEl>
+                                        <p:attrNameLst>
+                                          <p:attrName>style.visibility</p:attrName>
+                                        </p:attrNameLst>
+                                      </p:cBhvr>
+                                      <p:to>
+                                        <p:strVal val="visible"/>
+                                      </p:to>
+                                    </p:set>
+                                  </p:childTnLst>
+                                </p:cTn>
+                              </p:par>
+                            </p:childTnLst>
+                          </p:cTn>
+                        </p:par>
+                      </p:childTnLst>
+                    </p:cTn>
+                  </p:par>
+                  <p:par>
+                    <p:cTn id="7" fill="hold">
+                      <p:stCondLst>
+                        <p:cond delay="indefinite"/>
+                      </p:stCondLst>
+                      <p:childTnLst>
+                        <p:par>
+                          <p:cTn id="8" fill="hold">
+                            <p:stCondLst>
+                              <p:cond delay="0"/>
+                            </p:stCondLst>
+                            <p:childTnLst>
+                              <p:par>
+                                <p:cTn id="9" presetID="1" presetClass="entr" presetSubtype="0" fill="hold" nodeType="clickEffect">
+                                  <p:stCondLst>
+                                    <p:cond delay="0"/>
+                                  </p:stCondLst>
+                                  <p:childTnLst>
+                                    <p:set>
+                                      <p:cBhvr>
+                                        <p:cTn id="10" dur="1" fill="hold">
+                                          <p:stCondLst>
+                                            <p:cond delay="0"/>
+                                          </p:stCondLst>
+                                        </p:cTn>
+                                        <p:tgtEl>
+                                          <p:spTgt spid="144">
+                                            <p:txEl>
+                                              <p:pRg st="4" end="4"/>
+                                            </p:txEl>
+                                          </p:spTgt>
+                                        </p:tgtEl>
+                                        <p:attrNameLst>
+                                          <p:attrName>style.visibility</p:attrName>
+                                        </p:attrNameLst>
+                                      </p:cBhvr>
+                                      <p:to>
+                                        <p:strVal val="visible"/>
+                                      </p:to>
+                                    </p:set>
+                                  </p:childTnLst>
+                                </p:cTn>
+                              </p:par>
+                            </p:childTnLst>
+                          </p:cTn>
+                        </p:par>
+                      </p:childTnLst>
+                    </p:cTn>
+                  </p:par>
+                </p:childTnLst>
+              </p:cTn>
+              <p:prevCondLst>
+                <p:cond evt="onPrev" delay="0">
+                  <p:tgtEl>
+                    <p:sldTgt/>
+                  </p:tgtEl>
+                </p:cond>
+              </p:prevCondLst>
+              <p:nextCondLst>
+                <p:cond evt="onNext" delay="0">
+                  <p:tgtEl>
+                    <p:sldTgt/>
+                  </p:tgtEl>
+                </p:cond>
+              </p:nextCondLst>
+            </p:seq>
+          </p:childTnLst>
+        </p:cTn>
+      </p:par>
+    </p:tnLst>
+  </p:timing>
 </p:sld>
 </file>
 
@@ -15090,7 +15507,7 @@
         </p:nvSpPr>
         <p:spPr>
           <a:xfrm>
-            <a:off x="6370625" y="1531725"/>
+            <a:off x="683057" y="1531725"/>
             <a:ext cx="4983300" cy="4645200"/>
           </a:xfrm>
           <a:prstGeom prst="rect">
@@ -15104,6 +15521,9 @@
           <a:lstStyle/>
           <a:p>
             <a:pPr marL="457200" lvl="0" indent="-228600" rtl="0">
+              <a:lnSpc>
+                <a:spcPct val="100000"/>
+              </a:lnSpc>
               <a:spcBef>
                 <a:spcPts val="0"/>
               </a:spcBef>
@@ -15115,6 +15535,9 @@
           </a:p>
           <a:p>
             <a:pPr marL="457200" lvl="0" indent="-228600" rtl="0">
+              <a:lnSpc>
+                <a:spcPct val="100000"/>
+              </a:lnSpc>
               <a:spcBef>
                 <a:spcPts val="0"/>
               </a:spcBef>
@@ -15126,6 +15549,9 @@
           </a:p>
           <a:p>
             <a:pPr marL="457200" lvl="0" indent="-228600" rtl="0">
+              <a:lnSpc>
+                <a:spcPct val="100000"/>
+              </a:lnSpc>
               <a:spcBef>
                 <a:spcPts val="0"/>
               </a:spcBef>
@@ -15137,6 +15563,9 @@
           </a:p>
           <a:p>
             <a:pPr marL="457200" lvl="0" indent="-228600">
+              <a:lnSpc>
+                <a:spcPct val="100000"/>
+              </a:lnSpc>
               <a:spcBef>
                 <a:spcPts val="0"/>
               </a:spcBef>
@@ -15164,8 +15593,8 @@
         </p:blipFill>
         <p:spPr>
           <a:xfrm>
-            <a:off x="1008099" y="1417637"/>
-            <a:ext cx="4676829" cy="5167175"/>
+            <a:off x="6019011" y="375221"/>
+            <a:ext cx="5740173" cy="5952427"/>
           </a:xfrm>
           <a:prstGeom prst="rect">
             <a:avLst/>
@@ -15227,6 +15656,13 @@
   <p:clrMapOvr>
     <a:masterClrMapping/>
   </p:clrMapOvr>
+  <p:timing>
+    <p:tnLst>
+      <p:par>
+        <p:cTn id="1" dur="indefinite" restart="never" nodeType="tmRoot"/>
+      </p:par>
+    </p:tnLst>
+  </p:timing>
 </p:sld>
 </file>
 
@@ -15297,7 +15733,7 @@
         </p:nvSpPr>
         <p:spPr>
           <a:xfrm>
-            <a:off x="5744000" y="1570050"/>
+            <a:off x="550208" y="1560906"/>
             <a:ext cx="5610000" cy="4606800"/>
           </a:xfrm>
           <a:prstGeom prst="rect">
@@ -15311,6 +15747,9 @@
           <a:lstStyle/>
           <a:p>
             <a:pPr marL="457200" lvl="0" indent="-228600" rtl="0">
+              <a:lnSpc>
+                <a:spcPct val="100000"/>
+              </a:lnSpc>
               <a:spcBef>
                 <a:spcPts val="0"/>
               </a:spcBef>
@@ -15322,6 +15761,9 @@
           </a:p>
           <a:p>
             <a:pPr marL="457200" lvl="0" indent="-228600" rtl="0">
+              <a:lnSpc>
+                <a:spcPct val="100000"/>
+              </a:lnSpc>
               <a:spcBef>
                 <a:spcPts val="0"/>
               </a:spcBef>
@@ -15358,8 +15800,8 @@
         </p:blipFill>
         <p:spPr>
           <a:xfrm>
-            <a:off x="838200" y="1570037"/>
-            <a:ext cx="4376830" cy="4862374"/>
+            <a:off x="6190488" y="317308"/>
+            <a:ext cx="5596128" cy="5982908"/>
           </a:xfrm>
           <a:prstGeom prst="rect">
             <a:avLst/>
@@ -15421,6 +15863,13 @@
   <p:clrMapOvr>
     <a:masterClrMapping/>
   </p:clrMapOvr>
+  <p:timing>
+    <p:tnLst>
+      <p:par>
+        <p:cTn id="1" dur="indefinite" restart="never" nodeType="tmRoot"/>
+      </p:par>
+    </p:tnLst>
+  </p:timing>
 </p:sld>
 </file>
 
@@ -15454,7 +15903,7 @@
         <p:spPr>
           <a:xfrm>
             <a:off x="838200" y="365125"/>
-            <a:ext cx="10515600" cy="1325700"/>
+            <a:ext cx="5562600" cy="1325700"/>
           </a:xfrm>
           <a:prstGeom prst="rect">
             <a:avLst/>
@@ -15491,7 +15940,7 @@
         </p:nvSpPr>
         <p:spPr>
           <a:xfrm>
-            <a:off x="6440250" y="1825625"/>
+            <a:off x="578946" y="1706753"/>
             <a:ext cx="4913700" cy="4727700"/>
           </a:xfrm>
           <a:prstGeom prst="rect">
@@ -15505,6 +15954,9 @@
           <a:lstStyle/>
           <a:p>
             <a:pPr marL="457200" lvl="0" indent="-228600" rtl="0">
+              <a:lnSpc>
+                <a:spcPct val="100000"/>
+              </a:lnSpc>
               <a:spcBef>
                 <a:spcPts val="0"/>
               </a:spcBef>
@@ -15524,6 +15976,9 @@
           </a:p>
           <a:p>
             <a:pPr marL="457200" lvl="0" indent="-228600">
+              <a:lnSpc>
+                <a:spcPct val="100000"/>
+              </a:lnSpc>
               <a:spcBef>
                 <a:spcPts val="0"/>
               </a:spcBef>
@@ -15551,8 +16006,8 @@
         </p:blipFill>
         <p:spPr>
           <a:xfrm>
-            <a:off x="1405650" y="1690825"/>
-            <a:ext cx="4389692" cy="4862374"/>
+            <a:off x="6050802" y="374088"/>
+            <a:ext cx="5680950" cy="5880407"/>
           </a:xfrm>
           <a:prstGeom prst="rect">
             <a:avLst/>
@@ -15614,6 +16069,13 @@
   <p:clrMapOvr>
     <a:masterClrMapping/>
   </p:clrMapOvr>
+  <p:timing>
+    <p:tnLst>
+      <p:par>
+        <p:cTn id="1" dur="indefinite" restart="never" nodeType="tmRoot"/>
+      </p:par>
+    </p:tnLst>
+  </p:timing>
 </p:sld>
 </file>
 
@@ -15693,7 +16155,7 @@
         </p:nvSpPr>
         <p:spPr>
           <a:xfrm>
-            <a:off x="6126950" y="1570050"/>
+            <a:off x="411950" y="1232597"/>
             <a:ext cx="5226900" cy="4606800"/>
           </a:xfrm>
           <a:prstGeom prst="rect">
@@ -15707,6 +16169,9 @@
           <a:lstStyle/>
           <a:p>
             <a:pPr marL="457200" lvl="0" indent="-228600" rtl="0">
+              <a:lnSpc>
+                <a:spcPct val="100000"/>
+              </a:lnSpc>
               <a:spcBef>
                 <a:spcPts val="0"/>
               </a:spcBef>
@@ -15718,6 +16183,9 @@
           </a:p>
           <a:p>
             <a:pPr marL="457200" lvl="0" indent="-228600" rtl="0">
+              <a:lnSpc>
+                <a:spcPct val="100000"/>
+              </a:lnSpc>
               <a:spcBef>
                 <a:spcPts val="0"/>
               </a:spcBef>
@@ -15729,6 +16197,9 @@
           </a:p>
           <a:p>
             <a:pPr marL="457200" lvl="0" indent="-228600">
+              <a:lnSpc>
+                <a:spcPct val="100000"/>
+              </a:lnSpc>
               <a:spcBef>
                 <a:spcPts val="0"/>
               </a:spcBef>
@@ -15756,8 +16227,8 @@
         </p:blipFill>
         <p:spPr>
           <a:xfrm>
-            <a:off x="1336025" y="1570037"/>
-            <a:ext cx="4338203" cy="4862374"/>
+            <a:off x="6099049" y="317308"/>
+            <a:ext cx="5747380" cy="5763451"/>
           </a:xfrm>
           <a:prstGeom prst="rect">
             <a:avLst/>
@@ -15819,6 +16290,13 @@
   <p:clrMapOvr>
     <a:masterClrMapping/>
   </p:clrMapOvr>
+  <p:timing>
+    <p:tnLst>
+      <p:par>
+        <p:cTn id="1" dur="indefinite" restart="never" nodeType="tmRoot"/>
+      </p:par>
+    </p:tnLst>
+  </p:timing>
 </p:sld>
 </file>
 
@@ -15909,8 +16387,20 @@
             </a:pPr>
             <a:r>
               <a:rPr lang="en-US" dirty="0"/>
-              <a:t>Set of supervised learning methods used for classification, regression and outliers’ detection</a:t>
+              <a:t>Set of supervised learning methods used for classification, regression and outliers’ </a:t>
             </a:r>
+            <a:r>
+              <a:rPr lang="en-US" dirty="0" smtClean="0"/>
+              <a:t>detection</a:t>
+            </a:r>
+          </a:p>
+          <a:p>
+            <a:pPr marL="457200" lvl="0" indent="-228600" rtl="0">
+              <a:spcBef>
+                <a:spcPts val="0"/>
+              </a:spcBef>
+            </a:pPr>
+            <a:endParaRPr lang="en-US" dirty="0"/>
           </a:p>
           <a:p>
             <a:pPr marL="457200" lvl="0" indent="-228600" rtl="0">
@@ -15922,6 +16412,15 @@
               <a:rPr lang="en-US" dirty="0"/>
               <a:t>Use subset  of training points in the decision function (support vectors) </a:t>
             </a:r>
+            <a:endParaRPr lang="en-US" dirty="0" smtClean="0"/>
+          </a:p>
+          <a:p>
+            <a:pPr marL="457200" lvl="0" indent="-228600" rtl="0">
+              <a:spcBef>
+                <a:spcPts val="0"/>
+              </a:spcBef>
+            </a:pPr>
+            <a:endParaRPr lang="en-US" dirty="0"/>
           </a:p>
           <a:p>
             <a:pPr marL="457200" lvl="0" indent="-228600" rtl="0">
@@ -15942,8 +16441,20 @@
             </a:pPr>
             <a:r>
               <a:rPr lang="en-US" dirty="0"/>
-              <a:t>they are calculated using five-fold cross-validation which takes a lot of time</a:t>
+              <a:t>they are calculated using five-fold cross-validation which takes a lot of </a:t>
             </a:r>
+            <a:r>
+              <a:rPr lang="en-US" dirty="0" smtClean="0"/>
+              <a:t>time</a:t>
+            </a:r>
+          </a:p>
+          <a:p>
+            <a:pPr marL="914400" lvl="1" indent="-228600" rtl="0">
+              <a:spcBef>
+                <a:spcPts val="0"/>
+              </a:spcBef>
+            </a:pPr>
+            <a:endParaRPr lang="en-US" dirty="0"/>
           </a:p>
           <a:p>
             <a:pPr marL="457200" lvl="0" indent="-228600">
@@ -16009,6 +16520,85 @@
   <p:clrMapOvr>
     <a:masterClrMapping/>
   </p:clrMapOvr>
+  <p:timing>
+    <p:tnLst>
+      <p:par>
+        <p:cTn id="1" dur="indefinite" restart="never" nodeType="tmRoot">
+          <p:childTnLst>
+            <p:seq concurrent="1" nextAc="seek">
+              <p:cTn id="2" dur="indefinite" nodeType="mainSeq">
+                <p:childTnLst>
+                  <p:par>
+                    <p:cTn id="3" fill="hold">
+                      <p:stCondLst>
+                        <p:cond delay="indefinite"/>
+                      </p:stCondLst>
+                      <p:childTnLst>
+                        <p:par>
+                          <p:cTn id="4" fill="hold">
+                            <p:stCondLst>
+                              <p:cond delay="0"/>
+                            </p:stCondLst>
+                            <p:childTnLst>
+                              <p:par>
+                                <p:cTn id="5" presetID="1" presetClass="entr" presetSubtype="0" fill="hold" nodeType="clickEffect">
+                                  <p:stCondLst>
+                                    <p:cond delay="0"/>
+                                  </p:stCondLst>
+                                  <p:childTnLst>
+                                    <p:set>
+                                      <p:cBhvr>
+                                        <p:cTn id="6" dur="1" fill="hold">
+                                          <p:stCondLst>
+                                            <p:cond delay="0"/>
+                                          </p:stCondLst>
+                                        </p:cTn>
+                                        <p:tgtEl>
+                                          <p:spTgt spid="178">
+                                            <p:txEl>
+                                              <p:pRg st="7" end="7"/>
+                                            </p:txEl>
+                                          </p:spTgt>
+                                        </p:tgtEl>
+                                        <p:attrNameLst>
+                                          <p:attrName>style.visibility</p:attrName>
+                                        </p:attrNameLst>
+                                      </p:cBhvr>
+                                      <p:to>
+                                        <p:strVal val="visible"/>
+                                      </p:to>
+                                    </p:set>
+                                  </p:childTnLst>
+                                </p:cTn>
+                              </p:par>
+                            </p:childTnLst>
+                          </p:cTn>
+                        </p:par>
+                      </p:childTnLst>
+                    </p:cTn>
+                  </p:par>
+                </p:childTnLst>
+              </p:cTn>
+              <p:prevCondLst>
+                <p:cond evt="onPrev" delay="0">
+                  <p:tgtEl>
+                    <p:sldTgt/>
+                  </p:tgtEl>
+                </p:cond>
+              </p:prevCondLst>
+              <p:nextCondLst>
+                <p:cond evt="onNext" delay="0">
+                  <p:tgtEl>
+                    <p:sldTgt/>
+                  </p:tgtEl>
+                </p:cond>
+              </p:nextCondLst>
+            </p:seq>
+          </p:childTnLst>
+        </p:cTn>
+      </p:par>
+    </p:tnLst>
+  </p:timing>
 </p:sld>
 </file>
 
@@ -16089,308 +16679,6 @@
       </p:sp>
       <p:sp>
         <p:nvSpPr>
-          <p:cNvPr id="184" name="Shape 184"/>
-          <p:cNvSpPr txBox="1">
-            <a:spLocks noGrp="1"/>
-          </p:cNvSpPr>
-          <p:nvPr>
-            <p:ph type="body" idx="1"/>
-          </p:nvPr>
-        </p:nvSpPr>
-        <p:spPr>
-          <a:xfrm>
-            <a:off x="838200" y="1199000"/>
-            <a:ext cx="10515600" cy="4893000"/>
-          </a:xfrm>
-          <a:prstGeom prst="rect">
-            <a:avLst/>
-          </a:prstGeom>
-          <a:noFill/>
-          <a:ln>
-            <a:noFill/>
-          </a:ln>
-        </p:spPr>
-        <p:txBody>
-          <a:bodyPr lIns="91425" tIns="45700" rIns="91425" bIns="45700" anchor="t" anchorCtr="0">
-            <a:noAutofit/>
-          </a:bodyPr>
-          <a:lstStyle/>
-          <a:p>
-            <a:pPr marL="228600" marR="0" lvl="0" indent="-215900" algn="l" rtl="0">
-              <a:lnSpc>
-                <a:spcPct val="90000"/>
-              </a:lnSpc>
-              <a:spcBef>
-                <a:spcPts val="0"/>
-              </a:spcBef>
-              <a:spcAft>
-                <a:spcPts val="0"/>
-              </a:spcAft>
-              <a:buClr>
-                <a:schemeClr val="dk1"/>
-              </a:buClr>
-              <a:buSzPct val="100000"/>
-              <a:buFont typeface="Arial"/>
-              <a:buAutoNum type="arabicPeriod"/>
-            </a:pPr>
-            <a:r>
-              <a:rPr lang="en-US" sz="2600" b="0" i="0" u="none" strike="noStrike" cap="none" dirty="0">
-                <a:solidFill>
-                  <a:schemeClr val="dk1"/>
-                </a:solidFill>
-                <a:latin typeface="Calibri"/>
-                <a:ea typeface="Calibri"/>
-                <a:cs typeface="Calibri"/>
-                <a:sym typeface="Calibri"/>
-              </a:rPr>
-              <a:t>Extra Tree Classifier </a:t>
-            </a:r>
-          </a:p>
-          <a:p>
-            <a:pPr marL="685800" marR="0" lvl="1" indent="-241300" algn="l" rtl="0">
-              <a:lnSpc>
-                <a:spcPct val="90000"/>
-              </a:lnSpc>
-              <a:spcBef>
-                <a:spcPts val="500"/>
-              </a:spcBef>
-              <a:spcAft>
-                <a:spcPts val="0"/>
-              </a:spcAft>
-              <a:buClr>
-                <a:schemeClr val="dk1"/>
-              </a:buClr>
-              <a:buSzPct val="100000"/>
-              <a:buFont typeface="Arial"/>
-              <a:buChar char="•"/>
-            </a:pPr>
-            <a:r>
-              <a:rPr lang="en-US" sz="2600" b="0" i="0" u="none" strike="noStrike" cap="none" dirty="0">
-                <a:solidFill>
-                  <a:schemeClr val="dk1"/>
-                </a:solidFill>
-                <a:latin typeface="Calibri"/>
-                <a:ea typeface="Calibri"/>
-                <a:cs typeface="Calibri"/>
-                <a:sym typeface="Calibri"/>
-              </a:rPr>
-              <a:t>Log loss: 0.317722</a:t>
-            </a:r>
-          </a:p>
-          <a:p>
-            <a:pPr lvl="0" rtl="0">
-              <a:spcBef>
-                <a:spcPts val="0"/>
-              </a:spcBef>
-              <a:buClr>
-                <a:schemeClr val="dk1"/>
-              </a:buClr>
-              <a:buSzPct val="100000"/>
-              <a:buFont typeface="Arial"/>
-              <a:buAutoNum type="arabicPeriod"/>
-            </a:pPr>
-            <a:r>
-              <a:rPr lang="en-US" sz="2600" dirty="0"/>
-              <a:t>Random Forest</a:t>
-            </a:r>
-          </a:p>
-          <a:p>
-            <a:pPr lvl="1" rtl="0">
-              <a:spcBef>
-                <a:spcPts val="0"/>
-              </a:spcBef>
-              <a:buClr>
-                <a:schemeClr val="dk1"/>
-              </a:buClr>
-              <a:buSzPct val="100000"/>
-              <a:buFont typeface="Arial"/>
-              <a:buChar char="•"/>
-            </a:pPr>
-            <a:r>
-              <a:rPr lang="en-US" sz="2600" dirty="0"/>
-              <a:t>Log loss: 0.553033</a:t>
-            </a:r>
-          </a:p>
-          <a:p>
-            <a:pPr lvl="0" rtl="0">
-              <a:spcBef>
-                <a:spcPts val="0"/>
-              </a:spcBef>
-              <a:buClr>
-                <a:schemeClr val="dk1"/>
-              </a:buClr>
-              <a:buSzPct val="100000"/>
-              <a:buFont typeface="Arial"/>
-              <a:buAutoNum type="arabicPeriod"/>
-            </a:pPr>
-            <a:r>
-              <a:rPr lang="en-US" sz="2600" dirty="0"/>
-              <a:t>Logistic Regression</a:t>
-            </a:r>
-          </a:p>
-          <a:p>
-            <a:pPr marR="0" lvl="1" algn="l" rtl="0">
-              <a:lnSpc>
-                <a:spcPct val="90000"/>
-              </a:lnSpc>
-              <a:spcBef>
-                <a:spcPts val="1000"/>
-              </a:spcBef>
-              <a:spcAft>
-                <a:spcPts val="0"/>
-              </a:spcAft>
-              <a:buClr>
-                <a:schemeClr val="dk1"/>
-              </a:buClr>
-              <a:buSzPct val="100000"/>
-              <a:buFont typeface="Arial"/>
-              <a:buChar char="•"/>
-            </a:pPr>
-            <a:r>
-              <a:rPr lang="en-US" sz="2600" dirty="0"/>
-              <a:t>Log loss: 0.583911</a:t>
-            </a:r>
-          </a:p>
-          <a:p>
-            <a:pPr marL="228600" marR="0" lvl="0" indent="-215900" algn="l" rtl="0">
-              <a:lnSpc>
-                <a:spcPct val="90000"/>
-              </a:lnSpc>
-              <a:spcBef>
-                <a:spcPts val="1000"/>
-              </a:spcBef>
-              <a:spcAft>
-                <a:spcPts val="0"/>
-              </a:spcAft>
-              <a:buClr>
-                <a:schemeClr val="dk1"/>
-              </a:buClr>
-              <a:buSzPct val="100000"/>
-              <a:buFont typeface="Arial"/>
-              <a:buAutoNum type="arabicPeriod"/>
-            </a:pPr>
-            <a:r>
-              <a:rPr lang="en-US" sz="2600" dirty="0"/>
-              <a:t>Deep Learning: Keras with TensorFlow</a:t>
-            </a:r>
-          </a:p>
-          <a:p>
-            <a:pPr marR="0" lvl="1" algn="l" rtl="0">
-              <a:lnSpc>
-                <a:spcPct val="90000"/>
-              </a:lnSpc>
-              <a:spcBef>
-                <a:spcPts val="1000"/>
-              </a:spcBef>
-              <a:spcAft>
-                <a:spcPts val="0"/>
-              </a:spcAft>
-              <a:buClr>
-                <a:schemeClr val="dk1"/>
-              </a:buClr>
-              <a:buSzPct val="100000"/>
-              <a:buFont typeface="Arial"/>
-              <a:buChar char="•"/>
-            </a:pPr>
-            <a:r>
-              <a:rPr lang="en-US" sz="2600" dirty="0"/>
-              <a:t>Log loss: 0.585499</a:t>
-            </a:r>
-          </a:p>
-          <a:p>
-            <a:pPr marL="228600" marR="0" lvl="0" indent="-215900" algn="l" rtl="0">
-              <a:lnSpc>
-                <a:spcPct val="90000"/>
-              </a:lnSpc>
-              <a:spcBef>
-                <a:spcPts val="1000"/>
-              </a:spcBef>
-              <a:spcAft>
-                <a:spcPts val="0"/>
-              </a:spcAft>
-              <a:buClr>
-                <a:schemeClr val="dk1"/>
-              </a:buClr>
-              <a:buSzPct val="100000"/>
-              <a:buFont typeface="Arial"/>
-              <a:buAutoNum type="arabicPeriod"/>
-            </a:pPr>
-            <a:r>
-              <a:rPr lang="en-US" sz="2600" dirty="0"/>
-              <a:t>Support Vector Machine</a:t>
-            </a:r>
-          </a:p>
-          <a:p>
-            <a:pPr marR="0" lvl="1" algn="l" rtl="0">
-              <a:lnSpc>
-                <a:spcPct val="90000"/>
-              </a:lnSpc>
-              <a:spcBef>
-                <a:spcPts val="1000"/>
-              </a:spcBef>
-              <a:spcAft>
-                <a:spcPts val="0"/>
-              </a:spcAft>
-              <a:buClr>
-                <a:schemeClr val="dk1"/>
-              </a:buClr>
-              <a:buSzPct val="100000"/>
-              <a:buFont typeface="Arial"/>
-              <a:buChar char="•"/>
-            </a:pPr>
-            <a:r>
-              <a:rPr lang="en-US" sz="2600" dirty="0"/>
-              <a:t>N/A</a:t>
-            </a:r>
-          </a:p>
-          <a:p>
-            <a:pPr marL="0" marR="0" lvl="0" indent="0" algn="l" rtl="0">
-              <a:lnSpc>
-                <a:spcPct val="90000"/>
-              </a:lnSpc>
-              <a:spcBef>
-                <a:spcPts val="500"/>
-              </a:spcBef>
-              <a:spcAft>
-                <a:spcPts val="0"/>
-              </a:spcAft>
-              <a:buNone/>
-            </a:pPr>
-            <a:endParaRPr dirty="0">
-              <a:solidFill>
-                <a:srgbClr val="000000"/>
-              </a:solidFill>
-            </a:endParaRPr>
-          </a:p>
-          <a:p>
-            <a:pPr marL="177800" marR="0" lvl="0" indent="-177800" algn="l" rtl="0">
-              <a:lnSpc>
-                <a:spcPct val="90000"/>
-              </a:lnSpc>
-              <a:spcBef>
-                <a:spcPts val="1000"/>
-              </a:spcBef>
-              <a:buClr>
-                <a:schemeClr val="dk1"/>
-              </a:buClr>
-              <a:buSzPct val="100000"/>
-              <a:buFont typeface="Arial"/>
-              <a:buNone/>
-            </a:pPr>
-            <a:endParaRPr sz="2800" b="0" i="0" u="none" strike="noStrike" cap="none" dirty="0">
-              <a:solidFill>
-                <a:schemeClr val="dk1"/>
-              </a:solidFill>
-              <a:latin typeface="Calibri"/>
-              <a:ea typeface="Calibri"/>
-              <a:cs typeface="Calibri"/>
-              <a:sym typeface="Calibri"/>
-            </a:endParaRPr>
-          </a:p>
-        </p:txBody>
-      </p:sp>
-      <p:sp>
-        <p:nvSpPr>
           <p:cNvPr id="2" name="Slide Number Placeholder 1"/>
           <p:cNvSpPr>
             <a:spLocks noGrp="1"/>
@@ -16435,11 +16723,246 @@
           </a:p>
         </p:txBody>
       </p:sp>
+      <p:graphicFrame>
+        <p:nvGraphicFramePr>
+          <p:cNvPr id="3" name="Table 2"/>
+          <p:cNvGraphicFramePr>
+            <a:graphicFrameLocks noGrp="1"/>
+          </p:cNvGraphicFramePr>
+          <p:nvPr>
+            <p:extLst>
+              <p:ext uri="{D42A27DB-BD31-4B8C-83A1-F6EECF244321}">
+                <p14:modId xmlns:p14="http://schemas.microsoft.com/office/powerpoint/2010/main" val="4245820005"/>
+              </p:ext>
+            </p:extLst>
+          </p:nvPr>
+        </p:nvGraphicFramePr>
+        <p:xfrm>
+          <a:off x="916432" y="1506050"/>
+          <a:ext cx="10266680" cy="4612360"/>
+        </p:xfrm>
+        <a:graphic>
+          <a:graphicData uri="http://schemas.openxmlformats.org/drawingml/2006/table">
+            <a:tbl>
+              <a:tblPr firstRow="1" bandRow="1">
+                <a:tableStyleId>{5C22544A-7EE6-4342-B048-85BDC9FD1C3A}</a:tableStyleId>
+              </a:tblPr>
+              <a:tblGrid>
+                <a:gridCol w="5133340"/>
+                <a:gridCol w="5133340"/>
+              </a:tblGrid>
+              <a:tr h="757880">
+                <a:tc>
+                  <a:txBody>
+                    <a:bodyPr/>
+                    <a:lstStyle/>
+                    <a:p>
+                      <a:r>
+                        <a:rPr lang="en-US" sz="2400" dirty="0" smtClean="0"/>
+                        <a:t>Algorithm</a:t>
+                      </a:r>
+                      <a:endParaRPr lang="en-US" sz="2400" dirty="0"/>
+                    </a:p>
+                  </a:txBody>
+                  <a:tcPr/>
+                </a:tc>
+                <a:tc>
+                  <a:txBody>
+                    <a:bodyPr/>
+                    <a:lstStyle/>
+                    <a:p>
+                      <a:r>
+                        <a:rPr lang="en-US" sz="2400" dirty="0" smtClean="0"/>
+                        <a:t>Log Loss</a:t>
+                      </a:r>
+                      <a:endParaRPr lang="en-US" sz="2400" dirty="0"/>
+                    </a:p>
+                  </a:txBody>
+                  <a:tcPr/>
+                </a:tc>
+              </a:tr>
+              <a:tr h="757880">
+                <a:tc>
+                  <a:txBody>
+                    <a:bodyPr/>
+                    <a:lstStyle/>
+                    <a:p>
+                      <a:r>
+                        <a:rPr lang="en-US" sz="2400" dirty="0" smtClean="0"/>
+                        <a:t>Extra Trees Classifier</a:t>
+                      </a:r>
+                      <a:endParaRPr lang="en-US" sz="2400" dirty="0"/>
+                    </a:p>
+                  </a:txBody>
+                  <a:tcPr/>
+                </a:tc>
+                <a:tc>
+                  <a:txBody>
+                    <a:bodyPr/>
+                    <a:lstStyle/>
+                    <a:p>
+                      <a:r>
+                        <a:rPr lang="en-US" sz="2400" dirty="0" smtClean="0"/>
+                        <a:t>0.317722</a:t>
+                      </a:r>
+                      <a:endParaRPr lang="en-US" sz="2400" dirty="0"/>
+                    </a:p>
+                  </a:txBody>
+                  <a:tcPr/>
+                </a:tc>
+              </a:tr>
+              <a:tr h="757880">
+                <a:tc>
+                  <a:txBody>
+                    <a:bodyPr/>
+                    <a:lstStyle/>
+                    <a:p>
+                      <a:r>
+                        <a:rPr lang="en-US" sz="2400" dirty="0" smtClean="0"/>
+                        <a:t>Random Forest Classifier</a:t>
+                      </a:r>
+                      <a:endParaRPr lang="en-US" sz="2400" dirty="0"/>
+                    </a:p>
+                  </a:txBody>
+                  <a:tcPr/>
+                </a:tc>
+                <a:tc>
+                  <a:txBody>
+                    <a:bodyPr/>
+                    <a:lstStyle/>
+                    <a:p>
+                      <a:r>
+                        <a:rPr lang="en-US" sz="2400" dirty="0" smtClean="0"/>
+                        <a:t>0.553033</a:t>
+                      </a:r>
+                      <a:endParaRPr lang="en-US" sz="2400" dirty="0"/>
+                    </a:p>
+                  </a:txBody>
+                  <a:tcPr/>
+                </a:tc>
+              </a:tr>
+              <a:tr h="757880">
+                <a:tc>
+                  <a:txBody>
+                    <a:bodyPr/>
+                    <a:lstStyle/>
+                    <a:p>
+                      <a:r>
+                        <a:rPr lang="en-US" sz="2400" dirty="0" smtClean="0"/>
+                        <a:t>Logistic Regression</a:t>
+                      </a:r>
+                      <a:endParaRPr lang="en-US" sz="2400" dirty="0"/>
+                    </a:p>
+                  </a:txBody>
+                  <a:tcPr/>
+                </a:tc>
+                <a:tc>
+                  <a:txBody>
+                    <a:bodyPr/>
+                    <a:lstStyle/>
+                    <a:p>
+                      <a:r>
+                        <a:rPr lang="en-US" sz="2400" dirty="0" smtClean="0"/>
+                        <a:t>0.583911</a:t>
+                      </a:r>
+                      <a:endParaRPr lang="en-US" sz="2400" dirty="0"/>
+                    </a:p>
+                  </a:txBody>
+                  <a:tcPr/>
+                </a:tc>
+              </a:tr>
+              <a:tr h="757880">
+                <a:tc>
+                  <a:txBody>
+                    <a:bodyPr/>
+                    <a:lstStyle/>
+                    <a:p>
+                      <a:r>
+                        <a:rPr lang="en-US" sz="2400" dirty="0" smtClean="0"/>
+                        <a:t>Deep Learning</a:t>
+                      </a:r>
+                      <a:r>
+                        <a:rPr lang="en-US" sz="2400" baseline="0" dirty="0" smtClean="0"/>
+                        <a:t>: </a:t>
+                      </a:r>
+                      <a:r>
+                        <a:rPr lang="en-US" sz="2400" baseline="0" dirty="0" err="1" smtClean="0"/>
+                        <a:t>Keras</a:t>
+                      </a:r>
+                      <a:r>
+                        <a:rPr lang="en-US" sz="2400" baseline="0" dirty="0" smtClean="0"/>
+                        <a:t> with </a:t>
+                      </a:r>
+                      <a:r>
+                        <a:rPr lang="en-US" sz="2400" baseline="0" dirty="0" err="1" smtClean="0"/>
+                        <a:t>TensorFlow</a:t>
+                      </a:r>
+                      <a:endParaRPr lang="en-US" sz="2400" dirty="0"/>
+                    </a:p>
+                  </a:txBody>
+                  <a:tcPr/>
+                </a:tc>
+                <a:tc>
+                  <a:txBody>
+                    <a:bodyPr/>
+                    <a:lstStyle/>
+                    <a:p>
+                      <a:r>
+                        <a:rPr lang="en-US" sz="2400" dirty="0" smtClean="0"/>
+                        <a:t>0.585499</a:t>
+                      </a:r>
+                      <a:endParaRPr lang="en-US" sz="2400" dirty="0"/>
+                    </a:p>
+                  </a:txBody>
+                  <a:tcPr/>
+                </a:tc>
+              </a:tr>
+              <a:tr h="757880">
+                <a:tc>
+                  <a:txBody>
+                    <a:bodyPr/>
+                    <a:lstStyle/>
+                    <a:p>
+                      <a:r>
+                        <a:rPr lang="en-US" sz="2400" dirty="0" smtClean="0"/>
+                        <a:t>Support Vector Machine</a:t>
+                      </a:r>
+                      <a:endParaRPr lang="en-US" sz="2400" dirty="0"/>
+                    </a:p>
+                  </a:txBody>
+                  <a:tcPr/>
+                </a:tc>
+                <a:tc>
+                  <a:txBody>
+                    <a:bodyPr/>
+                    <a:lstStyle/>
+                    <a:p>
+                      <a:r>
+                        <a:rPr lang="en-US" sz="2400" dirty="0" smtClean="0"/>
+                        <a:t>N/A</a:t>
+                      </a:r>
+                      <a:endParaRPr lang="en-US" sz="2400" dirty="0"/>
+                    </a:p>
+                  </a:txBody>
+                  <a:tcPr/>
+                </a:tc>
+              </a:tr>
+            </a:tbl>
+          </a:graphicData>
+        </a:graphic>
+      </p:graphicFrame>
     </p:spTree>
   </p:cSld>
   <p:clrMapOvr>
     <a:masterClrMapping/>
   </p:clrMapOvr>
+  <p:timing>
+    <p:tnLst>
+      <p:par>
+        <p:cTn id="1" dur="indefinite" restart="never" nodeType="tmRoot"/>
+      </p:par>
+    </p:tnLst>
+  </p:timing>
 </p:sld>
 </file>
 
@@ -16599,8 +17122,13 @@
             </a:pPr>
             <a:r>
               <a:rPr lang="en-US" dirty="0"/>
-              <a:t>The logistic regression model submitted has more ability to handle randomness; therefore it may be more general and robust, even though it scored worse in previous year outcomes.</a:t>
+              <a:t>The logistic regression model submitted has more ability to handle randomness; therefore it may be more general and robust, even though it scored worse in previous year </a:t>
             </a:r>
+            <a:r>
+              <a:rPr lang="en-US" dirty="0" smtClean="0"/>
+              <a:t>outcomes</a:t>
+            </a:r>
+            <a:endParaRPr lang="en-US" dirty="0"/>
           </a:p>
           <a:p>
             <a:pPr marL="228600" marR="0" lvl="0" indent="-228600" algn="l" rtl="0">
@@ -16672,6 +17200,134 @@
   <p:clrMapOvr>
     <a:masterClrMapping/>
   </p:clrMapOvr>
+  <p:timing>
+    <p:tnLst>
+      <p:par>
+        <p:cTn id="1" dur="indefinite" restart="never" nodeType="tmRoot">
+          <p:childTnLst>
+            <p:seq concurrent="1" nextAc="seek">
+              <p:cTn id="2" dur="indefinite" nodeType="mainSeq">
+                <p:childTnLst>
+                  <p:par>
+                    <p:cTn id="3" fill="hold">
+                      <p:stCondLst>
+                        <p:cond delay="indefinite"/>
+                      </p:stCondLst>
+                      <p:childTnLst>
+                        <p:par>
+                          <p:cTn id="4" fill="hold">
+                            <p:stCondLst>
+                              <p:cond delay="0"/>
+                            </p:stCondLst>
+                            <p:childTnLst>
+                              <p:par>
+                                <p:cTn id="5" presetID="1" presetClass="entr" presetSubtype="0" fill="hold" nodeType="clickEffect">
+                                  <p:stCondLst>
+                                    <p:cond delay="0"/>
+                                  </p:stCondLst>
+                                  <p:childTnLst>
+                                    <p:set>
+                                      <p:cBhvr>
+                                        <p:cTn id="6" dur="1" fill="hold">
+                                          <p:stCondLst>
+                                            <p:cond delay="0"/>
+                                          </p:stCondLst>
+                                        </p:cTn>
+                                        <p:tgtEl>
+                                          <p:spTgt spid="190">
+                                            <p:txEl>
+                                              <p:pRg st="2" end="2"/>
+                                            </p:txEl>
+                                          </p:spTgt>
+                                        </p:tgtEl>
+                                        <p:attrNameLst>
+                                          <p:attrName>style.visibility</p:attrName>
+                                        </p:attrNameLst>
+                                      </p:cBhvr>
+                                      <p:to>
+                                        <p:strVal val="visible"/>
+                                      </p:to>
+                                    </p:set>
+                                  </p:childTnLst>
+                                </p:cTn>
+                              </p:par>
+                            </p:childTnLst>
+                          </p:cTn>
+                        </p:par>
+                      </p:childTnLst>
+                    </p:cTn>
+                  </p:par>
+                  <p:par>
+                    <p:cTn id="7" fill="hold">
+                      <p:stCondLst>
+                        <p:cond delay="indefinite"/>
+                      </p:stCondLst>
+                      <p:childTnLst>
+                        <p:par>
+                          <p:cTn id="8" fill="hold">
+                            <p:stCondLst>
+                              <p:cond delay="0"/>
+                            </p:stCondLst>
+                            <p:childTnLst>
+                              <p:par>
+                                <p:cTn id="9" presetID="1" presetClass="entr" presetSubtype="0" fill="hold" nodeType="clickEffect">
+                                  <p:stCondLst>
+                                    <p:cond delay="0"/>
+                                  </p:stCondLst>
+                                  <p:childTnLst>
+                                    <p:set>
+                                      <p:cBhvr>
+                                        <p:cTn id="10" dur="1" fill="hold">
+                                          <p:stCondLst>
+                                            <p:cond delay="0"/>
+                                          </p:stCondLst>
+                                        </p:cTn>
+                                        <p:tgtEl>
+                                          <p:spTgt spid="190">
+                                            <p:txEl>
+                                              <p:pRg st="3" end="3"/>
+                                            </p:txEl>
+                                          </p:spTgt>
+                                        </p:tgtEl>
+                                        <p:attrNameLst>
+                                          <p:attrName>style.visibility</p:attrName>
+                                        </p:attrNameLst>
+                                      </p:cBhvr>
+                                      <p:to>
+                                        <p:strVal val="visible"/>
+                                      </p:to>
+                                    </p:set>
+                                  </p:childTnLst>
+                                </p:cTn>
+                              </p:par>
+                            </p:childTnLst>
+                          </p:cTn>
+                        </p:par>
+                      </p:childTnLst>
+                    </p:cTn>
+                  </p:par>
+                </p:childTnLst>
+              </p:cTn>
+              <p:prevCondLst>
+                <p:cond evt="onPrev" delay="0">
+                  <p:tgtEl>
+                    <p:sldTgt/>
+                  </p:tgtEl>
+                </p:cond>
+              </p:prevCondLst>
+              <p:nextCondLst>
+                <p:cond evt="onNext" delay="0">
+                  <p:tgtEl>
+                    <p:sldTgt/>
+                  </p:tgtEl>
+                </p:cond>
+              </p:nextCondLst>
+            </p:seq>
+          </p:childTnLst>
+        </p:cTn>
+      </p:par>
+    </p:tnLst>
+  </p:timing>
 </p:sld>
 </file>
 
@@ -16725,8 +17381,13 @@
             </a:pPr>
             <a:r>
               <a:rPr lang="en-US" dirty="0"/>
-              <a:t>Conclusion continued</a:t>
+              <a:t>Conclusion </a:t>
             </a:r>
+            <a:r>
+              <a:rPr lang="en-US" dirty="0" smtClean="0"/>
+              <a:t>(cont.)</a:t>
+            </a:r>
+            <a:endParaRPr lang="en-US" dirty="0"/>
           </a:p>
         </p:txBody>
       </p:sp>
@@ -16762,8 +17423,20 @@
             </a:pPr>
             <a:r>
               <a:rPr lang="en-US" dirty="0"/>
-              <a:t>This is a difficult problem to predict due to possible game upsets. Our models with higher accuracies tend to choose the higher seeded team to win almost every time, resulting in all number 1 seeds in the Final Four.</a:t>
+              <a:t>This is a difficult problem to predict due to possible game upsets. Our models with higher accuracies tend to choose the higher seeded team to win almost every time, resulting in all number 1 seeds in the Final </a:t>
             </a:r>
+            <a:r>
+              <a:rPr lang="en-US" dirty="0" smtClean="0"/>
+              <a:t>Four</a:t>
+            </a:r>
+          </a:p>
+          <a:p>
+            <a:pPr marL="457200" lvl="0" indent="-228600" rtl="0">
+              <a:spcBef>
+                <a:spcPts val="0"/>
+              </a:spcBef>
+            </a:pPr>
+            <a:endParaRPr lang="en-US" dirty="0"/>
           </a:p>
           <a:p>
             <a:pPr marL="457200" lvl="0" indent="-228600">
@@ -16829,6 +17502,13 @@
   <p:clrMapOvr>
     <a:masterClrMapping/>
   </p:clrMapOvr>
+  <p:timing>
+    <p:tnLst>
+      <p:par>
+        <p:cTn id="1" dur="indefinite" restart="never" nodeType="tmRoot"/>
+      </p:par>
+    </p:tnLst>
+  </p:timing>
 </p:sld>
 </file>
 
@@ -16979,7 +17659,7 @@
               </a:spcAft>
               <a:buNone/>
             </a:pPr>
-            <a:endParaRPr dirty="0"/>
+            <a:endParaRPr sz="1600" dirty="0"/>
           </a:p>
           <a:p>
             <a:pPr marL="228600" marR="0" lvl="0" indent="-228600" algn="l" rtl="0">
@@ -17025,7 +17705,7 @@
               </a:spcAft>
               <a:buNone/>
             </a:pPr>
-            <a:endParaRPr dirty="0"/>
+            <a:endParaRPr sz="1600" dirty="0"/>
           </a:p>
           <a:p>
             <a:pPr marL="228600" marR="0" lvl="0" indent="-228600" algn="l" rtl="0">
@@ -17055,8 +17735,83 @@
                 <a:cs typeface="Calibri"/>
                 <a:sym typeface="Calibri"/>
               </a:rPr>
-              <a:t>For this project, we entered the Kaggle competition, “March Machine Learning Madness 2017” to compete using machine learning algorithms in Python to predict this year’s bracket</a:t>
+              <a:t>For this project, we entered the Kaggle competition, “March Machine Learning Madness 2017” to compete using machine learning algorithms in Python to predict this year’s </a:t>
             </a:r>
+            <a:r>
+              <a:rPr lang="en-US" sz="2800" b="0" i="0" u="none" strike="noStrike" cap="none" dirty="0" smtClean="0">
+                <a:solidFill>
+                  <a:schemeClr val="dk1"/>
+                </a:solidFill>
+                <a:latin typeface="Calibri"/>
+                <a:ea typeface="Calibri"/>
+                <a:cs typeface="Calibri"/>
+                <a:sym typeface="Calibri"/>
+              </a:rPr>
+              <a:t>bracket</a:t>
+            </a:r>
+          </a:p>
+          <a:p>
+            <a:pPr marL="228600" marR="0" lvl="0" indent="-228600" algn="l" rtl="0">
+              <a:lnSpc>
+                <a:spcPct val="90000"/>
+              </a:lnSpc>
+              <a:spcBef>
+                <a:spcPts val="1000"/>
+              </a:spcBef>
+              <a:spcAft>
+                <a:spcPts val="0"/>
+              </a:spcAft>
+              <a:buClr>
+                <a:schemeClr val="dk1"/>
+              </a:buClr>
+              <a:buSzPct val="100000"/>
+              <a:buFont typeface="Arial"/>
+              <a:buChar char="•"/>
+            </a:pPr>
+            <a:endParaRPr lang="en-US" sz="2400" b="0" i="0" u="none" strike="noStrike" cap="none" dirty="0" smtClean="0">
+              <a:solidFill>
+                <a:schemeClr val="dk1"/>
+              </a:solidFill>
+              <a:latin typeface="Calibri"/>
+              <a:ea typeface="Calibri"/>
+              <a:cs typeface="Calibri"/>
+              <a:sym typeface="Calibri"/>
+            </a:endParaRPr>
+          </a:p>
+          <a:p>
+            <a:pPr indent="-228600"/>
+            <a:r>
+              <a:rPr lang="en-US" dirty="0"/>
+              <a:t>Odds of a perfect bracket are 1 in 9.2 quintillion</a:t>
+            </a:r>
+          </a:p>
+          <a:p>
+            <a:pPr marL="228600" marR="0" lvl="0" indent="-228600" algn="l" rtl="0">
+              <a:lnSpc>
+                <a:spcPct val="90000"/>
+              </a:lnSpc>
+              <a:spcBef>
+                <a:spcPts val="1000"/>
+              </a:spcBef>
+              <a:spcAft>
+                <a:spcPts val="0"/>
+              </a:spcAft>
+              <a:buClr>
+                <a:schemeClr val="dk1"/>
+              </a:buClr>
+              <a:buSzPct val="100000"/>
+              <a:buFont typeface="Arial"/>
+              <a:buChar char="•"/>
+            </a:pPr>
+            <a:endParaRPr lang="en-US" sz="2800" b="0" i="0" u="none" strike="noStrike" cap="none" dirty="0">
+              <a:solidFill>
+                <a:schemeClr val="dk1"/>
+              </a:solidFill>
+              <a:latin typeface="Calibri"/>
+              <a:ea typeface="Calibri"/>
+              <a:cs typeface="Calibri"/>
+              <a:sym typeface="Calibri"/>
+            </a:endParaRPr>
           </a:p>
           <a:p>
             <a:pPr marL="228600" marR="0" lvl="0" indent="-228600" algn="l" rtl="0">
@@ -17136,6 +17891,183 @@
   <p:clrMapOvr>
     <a:masterClrMapping/>
   </p:clrMapOvr>
+  <p:timing>
+    <p:tnLst>
+      <p:par>
+        <p:cTn id="1" dur="indefinite" restart="never" nodeType="tmRoot">
+          <p:childTnLst>
+            <p:seq concurrent="1" nextAc="seek">
+              <p:cTn id="2" dur="indefinite" nodeType="mainSeq">
+                <p:childTnLst>
+                  <p:par>
+                    <p:cTn id="3" fill="hold">
+                      <p:stCondLst>
+                        <p:cond delay="indefinite"/>
+                      </p:stCondLst>
+                      <p:childTnLst>
+                        <p:par>
+                          <p:cTn id="4" fill="hold">
+                            <p:stCondLst>
+                              <p:cond delay="0"/>
+                            </p:stCondLst>
+                            <p:childTnLst>
+                              <p:par>
+                                <p:cTn id="5" presetID="1" presetClass="entr" presetSubtype="0" fill="hold" nodeType="clickEffect">
+                                  <p:stCondLst>
+                                    <p:cond delay="0"/>
+                                  </p:stCondLst>
+                                  <p:childTnLst>
+                                    <p:set>
+                                      <p:cBhvr>
+                                        <p:cTn id="6" dur="1" fill="hold">
+                                          <p:stCondLst>
+                                            <p:cond delay="0"/>
+                                          </p:stCondLst>
+                                        </p:cTn>
+                                        <p:tgtEl>
+                                          <p:spTgt spid="91">
+                                            <p:txEl>
+                                              <p:pRg st="2" end="2"/>
+                                            </p:txEl>
+                                          </p:spTgt>
+                                        </p:tgtEl>
+                                        <p:attrNameLst>
+                                          <p:attrName>style.visibility</p:attrName>
+                                        </p:attrNameLst>
+                                      </p:cBhvr>
+                                      <p:to>
+                                        <p:strVal val="visible"/>
+                                      </p:to>
+                                    </p:set>
+                                  </p:childTnLst>
+                                </p:cTn>
+                              </p:par>
+                            </p:childTnLst>
+                          </p:cTn>
+                        </p:par>
+                      </p:childTnLst>
+                    </p:cTn>
+                  </p:par>
+                  <p:par>
+                    <p:cTn id="7" fill="hold">
+                      <p:stCondLst>
+                        <p:cond delay="indefinite"/>
+                      </p:stCondLst>
+                      <p:childTnLst>
+                        <p:par>
+                          <p:cTn id="8" fill="hold">
+                            <p:stCondLst>
+                              <p:cond delay="0"/>
+                            </p:stCondLst>
+                            <p:childTnLst>
+                              <p:par>
+                                <p:cTn id="9" presetID="1" presetClass="entr" presetSubtype="0" fill="hold" nodeType="clickEffect">
+                                  <p:stCondLst>
+                                    <p:cond delay="0"/>
+                                  </p:stCondLst>
+                                  <p:childTnLst>
+                                    <p:set>
+                                      <p:cBhvr>
+                                        <p:cTn id="10" dur="1" fill="hold">
+                                          <p:stCondLst>
+                                            <p:cond delay="0"/>
+                                          </p:stCondLst>
+                                        </p:cTn>
+                                        <p:tgtEl>
+                                          <p:spTgt spid="91">
+                                            <p:txEl>
+                                              <p:pRg st="4" end="4"/>
+                                            </p:txEl>
+                                          </p:spTgt>
+                                        </p:tgtEl>
+                                        <p:attrNameLst>
+                                          <p:attrName>style.visibility</p:attrName>
+                                        </p:attrNameLst>
+                                      </p:cBhvr>
+                                      <p:to>
+                                        <p:strVal val="visible"/>
+                                      </p:to>
+                                    </p:set>
+                                  </p:childTnLst>
+                                </p:cTn>
+                              </p:par>
+                            </p:childTnLst>
+                          </p:cTn>
+                        </p:par>
+                      </p:childTnLst>
+                    </p:cTn>
+                  </p:par>
+                  <p:par>
+                    <p:cTn id="11" fill="hold">
+                      <p:stCondLst>
+                        <p:cond delay="indefinite"/>
+                      </p:stCondLst>
+                      <p:childTnLst>
+                        <p:par>
+                          <p:cTn id="12" fill="hold">
+                            <p:stCondLst>
+                              <p:cond delay="0"/>
+                            </p:stCondLst>
+                            <p:childTnLst>
+                              <p:par>
+                                <p:cTn id="13" presetID="1" presetClass="entr" presetSubtype="0" fill="hold" nodeType="clickEffect">
+                                  <p:stCondLst>
+                                    <p:cond delay="0"/>
+                                  </p:stCondLst>
+                                  <p:childTnLst>
+                                    <p:set>
+                                      <p:cBhvr>
+                                        <p:cTn id="14" dur="1" fill="hold">
+                                          <p:stCondLst>
+                                            <p:cond delay="0"/>
+                                          </p:stCondLst>
+                                        </p:cTn>
+                                        <p:tgtEl>
+                                          <p:spTgt spid="91">
+                                            <p:txEl>
+                                              <p:pRg st="6" end="6"/>
+                                            </p:txEl>
+                                          </p:spTgt>
+                                        </p:tgtEl>
+                                        <p:attrNameLst>
+                                          <p:attrName>style.visibility</p:attrName>
+                                        </p:attrNameLst>
+                                      </p:cBhvr>
+                                      <p:to>
+                                        <p:strVal val="visible"/>
+                                      </p:to>
+                                    </p:set>
+                                  </p:childTnLst>
+                                </p:cTn>
+                              </p:par>
+                            </p:childTnLst>
+                          </p:cTn>
+                        </p:par>
+                      </p:childTnLst>
+                    </p:cTn>
+                  </p:par>
+                </p:childTnLst>
+              </p:cTn>
+              <p:prevCondLst>
+                <p:cond evt="onPrev" delay="0">
+                  <p:tgtEl>
+                    <p:sldTgt/>
+                  </p:tgtEl>
+                </p:cond>
+              </p:prevCondLst>
+              <p:nextCondLst>
+                <p:cond evt="onNext" delay="0">
+                  <p:tgtEl>
+                    <p:sldTgt/>
+                  </p:tgtEl>
+                </p:cond>
+              </p:nextCondLst>
+            </p:seq>
+          </p:childTnLst>
+        </p:cTn>
+      </p:par>
+    </p:tnLst>
+  </p:timing>
 </p:sld>
 </file>
 
@@ -17390,6 +18322,214 @@
   <p:clrMapOvr>
     <a:masterClrMapping/>
   </p:clrMapOvr>
+  <p:timing>
+    <p:tnLst>
+      <p:par>
+        <p:cTn id="1" dur="indefinite" restart="never" nodeType="tmRoot">
+          <p:childTnLst>
+            <p:seq concurrent="1" nextAc="seek">
+              <p:cTn id="2" dur="indefinite" nodeType="mainSeq">
+                <p:childTnLst>
+                  <p:par>
+                    <p:cTn id="3" fill="hold">
+                      <p:stCondLst>
+                        <p:cond delay="indefinite"/>
+                      </p:stCondLst>
+                      <p:childTnLst>
+                        <p:par>
+                          <p:cTn id="4" fill="hold">
+                            <p:stCondLst>
+                              <p:cond delay="0"/>
+                            </p:stCondLst>
+                            <p:childTnLst>
+                              <p:par>
+                                <p:cTn id="5" presetID="1" presetClass="entr" presetSubtype="0" fill="hold" nodeType="clickEffect">
+                                  <p:stCondLst>
+                                    <p:cond delay="0"/>
+                                  </p:stCondLst>
+                                  <p:childTnLst>
+                                    <p:set>
+                                      <p:cBhvr>
+                                        <p:cTn id="6" dur="1" fill="hold">
+                                          <p:stCondLst>
+                                            <p:cond delay="0"/>
+                                          </p:stCondLst>
+                                        </p:cTn>
+                                        <p:tgtEl>
+                                          <p:spTgt spid="202">
+                                            <p:txEl>
+                                              <p:pRg st="3" end="3"/>
+                                            </p:txEl>
+                                          </p:spTgt>
+                                        </p:tgtEl>
+                                        <p:attrNameLst>
+                                          <p:attrName>style.visibility</p:attrName>
+                                        </p:attrNameLst>
+                                      </p:cBhvr>
+                                      <p:to>
+                                        <p:strVal val="visible"/>
+                                      </p:to>
+                                    </p:set>
+                                  </p:childTnLst>
+                                </p:cTn>
+                              </p:par>
+                              <p:par>
+                                <p:cTn id="7" presetID="1" presetClass="entr" presetSubtype="0" fill="hold" nodeType="withEffect">
+                                  <p:stCondLst>
+                                    <p:cond delay="0"/>
+                                  </p:stCondLst>
+                                  <p:childTnLst>
+                                    <p:set>
+                                      <p:cBhvr>
+                                        <p:cTn id="8" dur="1" fill="hold">
+                                          <p:stCondLst>
+                                            <p:cond delay="0"/>
+                                          </p:stCondLst>
+                                        </p:cTn>
+                                        <p:tgtEl>
+                                          <p:spTgt spid="202">
+                                            <p:txEl>
+                                              <p:pRg st="4" end="4"/>
+                                            </p:txEl>
+                                          </p:spTgt>
+                                        </p:tgtEl>
+                                        <p:attrNameLst>
+                                          <p:attrName>style.visibility</p:attrName>
+                                        </p:attrNameLst>
+                                      </p:cBhvr>
+                                      <p:to>
+                                        <p:strVal val="visible"/>
+                                      </p:to>
+                                    </p:set>
+                                  </p:childTnLst>
+                                </p:cTn>
+                              </p:par>
+                            </p:childTnLst>
+                          </p:cTn>
+                        </p:par>
+                      </p:childTnLst>
+                    </p:cTn>
+                  </p:par>
+                  <p:par>
+                    <p:cTn id="9" fill="hold">
+                      <p:stCondLst>
+                        <p:cond delay="indefinite"/>
+                      </p:stCondLst>
+                      <p:childTnLst>
+                        <p:par>
+                          <p:cTn id="10" fill="hold">
+                            <p:stCondLst>
+                              <p:cond delay="0"/>
+                            </p:stCondLst>
+                            <p:childTnLst>
+                              <p:par>
+                                <p:cTn id="11" presetID="1" presetClass="entr" presetSubtype="0" fill="hold" nodeType="clickEffect">
+                                  <p:stCondLst>
+                                    <p:cond delay="0"/>
+                                  </p:stCondLst>
+                                  <p:childTnLst>
+                                    <p:set>
+                                      <p:cBhvr>
+                                        <p:cTn id="12" dur="1" fill="hold">
+                                          <p:stCondLst>
+                                            <p:cond delay="0"/>
+                                          </p:stCondLst>
+                                        </p:cTn>
+                                        <p:tgtEl>
+                                          <p:spTgt spid="202">
+                                            <p:txEl>
+                                              <p:pRg st="5" end="5"/>
+                                            </p:txEl>
+                                          </p:spTgt>
+                                        </p:tgtEl>
+                                        <p:attrNameLst>
+                                          <p:attrName>style.visibility</p:attrName>
+                                        </p:attrNameLst>
+                                      </p:cBhvr>
+                                      <p:to>
+                                        <p:strVal val="visible"/>
+                                      </p:to>
+                                    </p:set>
+                                  </p:childTnLst>
+                                </p:cTn>
+                              </p:par>
+                            </p:childTnLst>
+                          </p:cTn>
+                        </p:par>
+                      </p:childTnLst>
+                    </p:cTn>
+                  </p:par>
+                  <p:par>
+                    <p:cTn id="13" fill="hold">
+                      <p:stCondLst>
+                        <p:cond delay="indefinite"/>
+                      </p:stCondLst>
+                      <p:childTnLst>
+                        <p:par>
+                          <p:cTn id="14" fill="hold">
+                            <p:stCondLst>
+                              <p:cond delay="0"/>
+                            </p:stCondLst>
+                            <p:childTnLst>
+                              <p:par>
+                                <p:cTn id="15" presetID="1" presetClass="entr" presetSubtype="0" fill="hold" nodeType="clickEffect">
+                                  <p:stCondLst>
+                                    <p:cond delay="0"/>
+                                  </p:stCondLst>
+                                  <p:childTnLst>
+                                    <p:set>
+                                      <p:cBhvr>
+                                        <p:cTn id="16" dur="1" fill="hold">
+                                          <p:stCondLst>
+                                            <p:cond delay="0"/>
+                                          </p:stCondLst>
+                                        </p:cTn>
+                                        <p:tgtEl>
+                                          <p:spTgt spid="202">
+                                            <p:txEl>
+                                              <p:pRg st="6" end="6"/>
+                                            </p:txEl>
+                                          </p:spTgt>
+                                        </p:tgtEl>
+                                        <p:attrNameLst>
+                                          <p:attrName>style.visibility</p:attrName>
+                                        </p:attrNameLst>
+                                      </p:cBhvr>
+                                      <p:to>
+                                        <p:strVal val="visible"/>
+                                      </p:to>
+                                    </p:set>
+                                  </p:childTnLst>
+                                </p:cTn>
+                              </p:par>
+                            </p:childTnLst>
+                          </p:cTn>
+                        </p:par>
+                      </p:childTnLst>
+                    </p:cTn>
+                  </p:par>
+                </p:childTnLst>
+              </p:cTn>
+              <p:prevCondLst>
+                <p:cond evt="onPrev" delay="0">
+                  <p:tgtEl>
+                    <p:sldTgt/>
+                  </p:tgtEl>
+                </p:cond>
+              </p:prevCondLst>
+              <p:nextCondLst>
+                <p:cond evt="onNext" delay="0">
+                  <p:tgtEl>
+                    <p:sldTgt/>
+                  </p:tgtEl>
+                </p:cond>
+              </p:nextCondLst>
+            </p:seq>
+          </p:childTnLst>
+        </p:cTn>
+      </p:par>
+    </p:tnLst>
+  </p:timing>
 </p:sld>
 </file>
 
@@ -17472,7 +18612,7 @@
         </p:nvSpPr>
         <p:spPr>
           <a:xfrm>
-            <a:off x="838200" y="1825625"/>
+            <a:off x="838200" y="1514729"/>
             <a:ext cx="10515600" cy="4351200"/>
           </a:xfrm>
           <a:prstGeom prst="rect">
@@ -17616,6 +18756,13 @@
   <p:clrMapOvr>
     <a:masterClrMapping/>
   </p:clrMapOvr>
+  <p:timing>
+    <p:tnLst>
+      <p:par>
+        <p:cTn id="1" dur="indefinite" restart="never" nodeType="tmRoot"/>
+      </p:par>
+    </p:tnLst>
+  </p:timing>
 </p:sld>
 </file>
 
@@ -17866,10 +19013,262 @@
   <p:clrMapOvr>
     <a:masterClrMapping/>
   </p:clrMapOvr>
+  <p:timing>
+    <p:tnLst>
+      <p:par>
+        <p:cTn id="1" dur="indefinite" restart="never" nodeType="tmRoot"/>
+      </p:par>
+    </p:tnLst>
+  </p:timing>
 </p:sld>
 </file>
 
 <file path=ppt/slides/slide24.xml><?xml version="1.0" encoding="utf-8"?>
+<p:sld xmlns:a="http://schemas.openxmlformats.org/drawingml/2006/main" xmlns:r="http://schemas.openxmlformats.org/officeDocument/2006/relationships" xmlns:p="http://schemas.openxmlformats.org/presentationml/2006/main">
+  <p:cSld>
+    <p:spTree>
+      <p:nvGrpSpPr>
+        <p:cNvPr id="1" name="Shape 206"/>
+        <p:cNvGrpSpPr/>
+        <p:nvPr/>
+      </p:nvGrpSpPr>
+      <p:grpSpPr>
+        <a:xfrm>
+          <a:off x="0" y="0"/>
+          <a:ext cx="0" cy="0"/>
+          <a:chOff x="0" y="0"/>
+          <a:chExt cx="0" cy="0"/>
+        </a:xfrm>
+      </p:grpSpPr>
+      <p:sp>
+        <p:nvSpPr>
+          <p:cNvPr id="207" name="Shape 207"/>
+          <p:cNvSpPr txBox="1">
+            <a:spLocks noGrp="1"/>
+          </p:cNvSpPr>
+          <p:nvPr>
+            <p:ph type="title"/>
+          </p:nvPr>
+        </p:nvSpPr>
+        <p:spPr>
+          <a:xfrm>
+            <a:off x="838200" y="365125"/>
+            <a:ext cx="10515600" cy="1325700"/>
+          </a:xfrm>
+          <a:prstGeom prst="rect">
+            <a:avLst/>
+          </a:prstGeom>
+          <a:noFill/>
+          <a:ln>
+            <a:noFill/>
+          </a:ln>
+        </p:spPr>
+        <p:txBody>
+          <a:bodyPr lIns="91425" tIns="45700" rIns="91425" bIns="45700" anchor="ctr" anchorCtr="0">
+            <a:noAutofit/>
+          </a:bodyPr>
+          <a:lstStyle/>
+          <a:p>
+            <a:pPr marL="0" marR="0" lvl="0" indent="0" algn="l" rtl="0">
+              <a:lnSpc>
+                <a:spcPct val="90000"/>
+              </a:lnSpc>
+              <a:spcBef>
+                <a:spcPts val="0"/>
+              </a:spcBef>
+              <a:buClr>
+                <a:schemeClr val="dk1"/>
+              </a:buClr>
+              <a:buSzPct val="25000"/>
+              <a:buFont typeface="Calibri"/>
+              <a:buNone/>
+            </a:pPr>
+            <a:r>
+              <a:rPr lang="en-US" dirty="0" smtClean="0"/>
+              <a:t>Log Loss function</a:t>
+            </a:r>
+            <a:endParaRPr lang="en-US" dirty="0"/>
+          </a:p>
+        </p:txBody>
+      </p:sp>
+      <p:sp>
+        <p:nvSpPr>
+          <p:cNvPr id="208" name="Shape 208"/>
+          <p:cNvSpPr txBox="1">
+            <a:spLocks noGrp="1"/>
+          </p:cNvSpPr>
+          <p:nvPr>
+            <p:ph type="body" idx="1"/>
+          </p:nvPr>
+        </p:nvSpPr>
+        <p:spPr>
+          <a:xfrm>
+            <a:off x="838200" y="1825625"/>
+            <a:ext cx="10515600" cy="4351200"/>
+          </a:xfrm>
+          <a:prstGeom prst="rect">
+            <a:avLst/>
+          </a:prstGeom>
+          <a:noFill/>
+          <a:ln>
+            <a:noFill/>
+          </a:ln>
+        </p:spPr>
+        <p:txBody>
+          <a:bodyPr lIns="91425" tIns="45700" rIns="91425" bIns="45700" anchor="t" anchorCtr="0">
+            <a:noAutofit/>
+          </a:bodyPr>
+          <a:lstStyle/>
+          <a:p>
+            <a:pPr marL="457200" lvl="0" indent="-381000" algn="just" rtl="0">
+              <a:lnSpc>
+                <a:spcPct val="100000"/>
+              </a:lnSpc>
+              <a:spcBef>
+                <a:spcPts val="0"/>
+              </a:spcBef>
+              <a:buSzPct val="100000"/>
+            </a:pPr>
+            <a:r>
+              <a:rPr lang="en-US" sz="2400" dirty="0" smtClean="0"/>
+              <a:t>Negative log-likelihood of the true labels given a probabilistic classifier’s prediction.</a:t>
+            </a:r>
+          </a:p>
+          <a:p>
+            <a:pPr marL="457200" lvl="0" indent="-381000" algn="just" rtl="0">
+              <a:lnSpc>
+                <a:spcPct val="100000"/>
+              </a:lnSpc>
+              <a:spcBef>
+                <a:spcPts val="0"/>
+              </a:spcBef>
+              <a:buSzPct val="100000"/>
+            </a:pPr>
+            <a:endParaRPr lang="en-US" sz="2400" dirty="0" smtClean="0"/>
+          </a:p>
+          <a:p>
+            <a:pPr marL="457200" lvl="0" indent="-381000" algn="just" rtl="0">
+              <a:lnSpc>
+                <a:spcPct val="100000"/>
+              </a:lnSpc>
+              <a:spcBef>
+                <a:spcPts val="0"/>
+              </a:spcBef>
+              <a:buSzPct val="100000"/>
+            </a:pPr>
+            <a:r>
+              <a:rPr lang="en-US" sz="2400" dirty="0" smtClean="0"/>
+              <a:t>Function used to score the algorithm.</a:t>
+            </a:r>
+          </a:p>
+          <a:p>
+            <a:pPr marL="457200" lvl="0" indent="-381000" algn="just" rtl="0">
+              <a:lnSpc>
+                <a:spcPct val="100000"/>
+              </a:lnSpc>
+              <a:spcBef>
+                <a:spcPts val="0"/>
+              </a:spcBef>
+              <a:buSzPct val="100000"/>
+            </a:pPr>
+            <a:endParaRPr lang="en-US" sz="2400" dirty="0"/>
+          </a:p>
+          <a:p>
+            <a:pPr marL="457200" lvl="0" indent="-381000" algn="just" rtl="0">
+              <a:lnSpc>
+                <a:spcPct val="100000"/>
+              </a:lnSpc>
+              <a:spcBef>
+                <a:spcPts val="0"/>
+              </a:spcBef>
+              <a:buSzPct val="100000"/>
+            </a:pPr>
+            <a:r>
+              <a:rPr lang="en-US" sz="2400" dirty="0" smtClean="0"/>
+              <a:t>Used in classification problems in machine learning and mathematical optimization</a:t>
+            </a:r>
+          </a:p>
+          <a:p>
+            <a:pPr marL="457200" lvl="0" indent="-381000" algn="just" rtl="0">
+              <a:lnSpc>
+                <a:spcPct val="100000"/>
+              </a:lnSpc>
+              <a:spcBef>
+                <a:spcPts val="0"/>
+              </a:spcBef>
+              <a:buSzPct val="100000"/>
+            </a:pPr>
+            <a:endParaRPr lang="en-US" sz="2400" dirty="0"/>
+          </a:p>
+        </p:txBody>
+      </p:sp>
+      <p:sp>
+        <p:nvSpPr>
+          <p:cNvPr id="2" name="Slide Number Placeholder 1"/>
+          <p:cNvSpPr>
+            <a:spLocks noGrp="1"/>
+          </p:cNvSpPr>
+          <p:nvPr>
+            <p:ph type="sldNum" idx="12"/>
+          </p:nvPr>
+        </p:nvSpPr>
+        <p:spPr/>
+        <p:txBody>
+          <a:bodyPr/>
+          <a:lstStyle/>
+          <a:p>
+            <a:pPr marL="0" marR="0" lvl="0" indent="0" algn="r" rtl="0">
+              <a:spcBef>
+                <a:spcPts val="0"/>
+              </a:spcBef>
+              <a:buSzPct val="25000"/>
+              <a:buNone/>
+            </a:pPr>
+            <a:fld id="{00000000-1234-1234-1234-123412341234}" type="slidenum">
+              <a:rPr lang="en-US" sz="1200" b="0" i="0" u="none" strike="noStrike" cap="none" smtClean="0">
+                <a:solidFill>
+                  <a:srgbClr val="888888"/>
+                </a:solidFill>
+                <a:latin typeface="Calibri"/>
+                <a:ea typeface="Calibri"/>
+                <a:cs typeface="Calibri"/>
+                <a:sym typeface="Calibri"/>
+              </a:rPr>
+              <a:t>24</a:t>
+            </a:fld>
+            <a:endParaRPr lang="en-US" sz="1200" b="0" i="0" u="none" strike="noStrike" cap="none" dirty="0">
+              <a:solidFill>
+                <a:srgbClr val="888888"/>
+              </a:solidFill>
+              <a:latin typeface="Calibri"/>
+              <a:ea typeface="Calibri"/>
+              <a:cs typeface="Calibri"/>
+              <a:sym typeface="Calibri"/>
+            </a:endParaRPr>
+          </a:p>
+        </p:txBody>
+      </p:sp>
+    </p:spTree>
+    <p:extLst>
+      <p:ext uri="{BB962C8B-B14F-4D97-AF65-F5344CB8AC3E}">
+        <p14:creationId xmlns:p14="http://schemas.microsoft.com/office/powerpoint/2010/main" val="1283689656"/>
+      </p:ext>
+    </p:extLst>
+  </p:cSld>
+  <p:clrMapOvr>
+    <a:masterClrMapping/>
+  </p:clrMapOvr>
+  <p:timing>
+    <p:tnLst>
+      <p:par>
+        <p:cTn id="1" dur="indefinite" restart="never" nodeType="tmRoot"/>
+      </p:par>
+    </p:tnLst>
+  </p:timing>
+</p:sld>
+</file>
+
+<file path=ppt/slides/slide25.xml><?xml version="1.0" encoding="utf-8"?>
 <p:sld xmlns:a="http://schemas.openxmlformats.org/drawingml/2006/main" xmlns:r="http://schemas.openxmlformats.org/officeDocument/2006/relationships" xmlns:p="http://schemas.openxmlformats.org/presentationml/2006/main">
   <p:cSld>
     <p:spTree>
@@ -17996,7 +19395,7 @@
                 <a:cs typeface="Calibri"/>
                 <a:sym typeface="Calibri"/>
               </a:rPr>
-              <a:t>24</a:t>
+              <a:t>25</a:t>
             </a:fld>
             <a:endParaRPr lang="en-US" sz="1200" b="0" i="0" u="none" strike="noStrike" cap="none" dirty="0">
               <a:solidFill>
@@ -18011,14 +19410,26 @@
         </p:txBody>
       </p:sp>
     </p:spTree>
+    <p:extLst>
+      <p:ext uri="{BB962C8B-B14F-4D97-AF65-F5344CB8AC3E}">
+        <p14:creationId xmlns:p14="http://schemas.microsoft.com/office/powerpoint/2010/main" val="3727826073"/>
+      </p:ext>
+    </p:extLst>
   </p:cSld>
   <p:clrMapOvr>
     <a:masterClrMapping/>
   </p:clrMapOvr>
+  <p:timing>
+    <p:tnLst>
+      <p:par>
+        <p:cTn id="1" dur="indefinite" restart="never" nodeType="tmRoot"/>
+      </p:par>
+    </p:tnLst>
+  </p:timing>
 </p:sld>
 </file>
 
-<file path=ppt/slides/slide25.xml><?xml version="1.0" encoding="utf-8"?>
+<file path=ppt/slides/slide26.xml><?xml version="1.0" encoding="utf-8"?>
 <p:sld xmlns:a="http://schemas.openxmlformats.org/drawingml/2006/main" xmlns:r="http://schemas.openxmlformats.org/officeDocument/2006/relationships" xmlns:p="http://schemas.openxmlformats.org/presentationml/2006/main">
   <p:cSld>
     <p:spTree>
@@ -18145,7 +19556,7 @@
                 <a:cs typeface="Calibri"/>
                 <a:sym typeface="Calibri"/>
               </a:rPr>
-              <a:t>25</a:t>
+              <a:t>26</a:t>
             </a:fld>
             <a:endParaRPr lang="en-US" sz="1200" b="0" i="0" u="none" strike="noStrike" cap="none" dirty="0">
               <a:solidFill>
@@ -18167,7 +19578,7 @@
 </p:sld>
 </file>
 
-<file path=ppt/slides/slide26.xml><?xml version="1.0" encoding="utf-8"?>
+<file path=ppt/slides/slide27.xml><?xml version="1.0" encoding="utf-8"?>
 <p:sld xmlns:a="http://schemas.openxmlformats.org/drawingml/2006/main" xmlns:r="http://schemas.openxmlformats.org/officeDocument/2006/relationships" xmlns:p="http://schemas.openxmlformats.org/presentationml/2006/main">
   <p:cSld>
     <p:spTree>
@@ -18294,7 +19705,7 @@
                 <a:cs typeface="Calibri"/>
                 <a:sym typeface="Calibri"/>
               </a:rPr>
-              <a:t>26</a:t>
+              <a:t>27</a:t>
             </a:fld>
             <a:endParaRPr lang="en-US" sz="1200" b="0" i="0" u="none" strike="noStrike" cap="none" dirty="0">
               <a:solidFill>
@@ -18316,7 +19727,7 @@
 </p:sld>
 </file>
 
-<file path=ppt/slides/slide27.xml><?xml version="1.0" encoding="utf-8"?>
+<file path=ppt/slides/slide28.xml><?xml version="1.0" encoding="utf-8"?>
 <p:sld xmlns:a="http://schemas.openxmlformats.org/drawingml/2006/main" xmlns:r="http://schemas.openxmlformats.org/officeDocument/2006/relationships" xmlns:p="http://schemas.openxmlformats.org/presentationml/2006/main">
   <p:cSld>
     <p:spTree>
@@ -18443,7 +19854,7 @@
                 <a:cs typeface="Calibri"/>
                 <a:sym typeface="Calibri"/>
               </a:rPr>
-              <a:t>27</a:t>
+              <a:t>28</a:t>
             </a:fld>
             <a:endParaRPr lang="en-US" sz="1200" b="0" i="0" u="none" strike="noStrike" cap="none" dirty="0">
               <a:solidFill>
@@ -18465,7 +19876,7 @@
 </p:sld>
 </file>
 
-<file path=ppt/slides/slide28.xml><?xml version="1.0" encoding="utf-8"?>
+<file path=ppt/slides/slide29.xml><?xml version="1.0" encoding="utf-8"?>
 <p:sld xmlns:a="http://schemas.openxmlformats.org/drawingml/2006/main" xmlns:r="http://schemas.openxmlformats.org/officeDocument/2006/relationships" xmlns:p="http://schemas.openxmlformats.org/presentationml/2006/main">
   <p:cSld>
     <p:spTree>
@@ -18550,155 +19961,6 @@
           <a:xfrm>
             <a:off x="152400" y="1843225"/>
             <a:ext cx="11887200" cy="3196632"/>
-          </a:xfrm>
-          <a:prstGeom prst="rect">
-            <a:avLst/>
-          </a:prstGeom>
-          <a:noFill/>
-          <a:ln>
-            <a:noFill/>
-          </a:ln>
-        </p:spPr>
-      </p:pic>
-      <p:sp>
-        <p:nvSpPr>
-          <p:cNvPr id="2" name="Slide Number Placeholder 1"/>
-          <p:cNvSpPr>
-            <a:spLocks noGrp="1"/>
-          </p:cNvSpPr>
-          <p:nvPr>
-            <p:ph type="sldNum" idx="12"/>
-          </p:nvPr>
-        </p:nvSpPr>
-        <p:spPr/>
-        <p:txBody>
-          <a:bodyPr/>
-          <a:lstStyle/>
-          <a:p>
-            <a:pPr marL="0" marR="0" lvl="0" indent="0" algn="r" rtl="0">
-              <a:spcBef>
-                <a:spcPts val="0"/>
-              </a:spcBef>
-              <a:buSzPct val="25000"/>
-              <a:buNone/>
-            </a:pPr>
-            <a:fld id="{00000000-1234-1234-1234-123412341234}" type="slidenum">
-              <a:rPr lang="en-US" sz="1200" b="0" i="0" u="none" strike="noStrike" cap="none" smtClean="0">
-                <a:solidFill>
-                  <a:srgbClr val="888888"/>
-                </a:solidFill>
-                <a:latin typeface="Calibri"/>
-                <a:ea typeface="Calibri"/>
-                <a:cs typeface="Calibri"/>
-                <a:sym typeface="Calibri"/>
-              </a:rPr>
-              <a:t>28</a:t>
-            </a:fld>
-            <a:endParaRPr lang="en-US" sz="1200" b="0" i="0" u="none" strike="noStrike" cap="none" dirty="0">
-              <a:solidFill>
-                <a:srgbClr val="888888"/>
-              </a:solidFill>
-              <a:latin typeface="Calibri"/>
-              <a:ea typeface="Calibri"/>
-              <a:cs typeface="Calibri"/>
-              <a:sym typeface="Calibri"/>
-            </a:endParaRPr>
-          </a:p>
-        </p:txBody>
-      </p:sp>
-    </p:spTree>
-  </p:cSld>
-  <p:clrMapOvr>
-    <a:masterClrMapping/>
-  </p:clrMapOvr>
-</p:sld>
-</file>
-
-<file path=ppt/slides/slide29.xml><?xml version="1.0" encoding="utf-8"?>
-<p:sld xmlns:a="http://schemas.openxmlformats.org/drawingml/2006/main" xmlns:r="http://schemas.openxmlformats.org/officeDocument/2006/relationships" xmlns:p="http://schemas.openxmlformats.org/presentationml/2006/main">
-  <p:cSld>
-    <p:spTree>
-      <p:nvGrpSpPr>
-        <p:cNvPr id="1" name="Shape 252"/>
-        <p:cNvGrpSpPr/>
-        <p:nvPr/>
-      </p:nvGrpSpPr>
-      <p:grpSpPr>
-        <a:xfrm>
-          <a:off x="0" y="0"/>
-          <a:ext cx="0" cy="0"/>
-          <a:chOff x="0" y="0"/>
-          <a:chExt cx="0" cy="0"/>
-        </a:xfrm>
-      </p:grpSpPr>
-      <p:sp>
-        <p:nvSpPr>
-          <p:cNvPr id="253" name="Shape 253"/>
-          <p:cNvSpPr txBox="1">
-            <a:spLocks noGrp="1"/>
-          </p:cNvSpPr>
-          <p:nvPr>
-            <p:ph type="title"/>
-          </p:nvPr>
-        </p:nvSpPr>
-        <p:spPr>
-          <a:xfrm>
-            <a:off x="838200" y="365125"/>
-            <a:ext cx="10515600" cy="1325700"/>
-          </a:xfrm>
-          <a:prstGeom prst="rect">
-            <a:avLst/>
-          </a:prstGeom>
-          <a:noFill/>
-          <a:ln>
-            <a:noFill/>
-          </a:ln>
-        </p:spPr>
-        <p:txBody>
-          <a:bodyPr lIns="91425" tIns="45700" rIns="91425" bIns="45700" anchor="ctr" anchorCtr="0">
-            <a:noAutofit/>
-          </a:bodyPr>
-          <a:lstStyle/>
-          <a:p>
-            <a:pPr marL="0" marR="0" lvl="0" indent="0" algn="l" rtl="0">
-              <a:lnSpc>
-                <a:spcPct val="90000"/>
-              </a:lnSpc>
-              <a:spcBef>
-                <a:spcPts val="0"/>
-              </a:spcBef>
-              <a:buClr>
-                <a:schemeClr val="dk1"/>
-              </a:buClr>
-              <a:buSzPct val="25000"/>
-              <a:buFont typeface="Calibri"/>
-              <a:buNone/>
-            </a:pPr>
-            <a:r>
-              <a:rPr lang="en-US" dirty="0"/>
-              <a:t>TourneyCompactResults.csv Screen Shot</a:t>
-            </a:r>
-          </a:p>
-        </p:txBody>
-      </p:sp>
-      <p:pic>
-        <p:nvPicPr>
-          <p:cNvPr id="254" name="Shape 254"/>
-          <p:cNvPicPr preferRelativeResize="0"/>
-          <p:nvPr/>
-        </p:nvPicPr>
-        <p:blipFill>
-          <a:blip r:embed="rId3">
-            <a:alphaModFix/>
-          </a:blip>
-          <a:stretch>
-            <a:fillRect/>
-          </a:stretch>
-        </p:blipFill>
-        <p:spPr>
-          <a:xfrm>
-            <a:off x="838200" y="1590200"/>
-            <a:ext cx="5832900" cy="5041300"/>
           </a:xfrm>
           <a:prstGeom prst="rect">
             <a:avLst/>
@@ -18858,10 +20120,166 @@
   <p:clrMapOvr>
     <a:masterClrMapping/>
   </p:clrMapOvr>
+  <p:timing>
+    <p:tnLst>
+      <p:par>
+        <p:cTn id="1" dur="indefinite" restart="never" nodeType="tmRoot"/>
+      </p:par>
+    </p:tnLst>
+  </p:timing>
 </p:sld>
 </file>
 
 <file path=ppt/slides/slide30.xml><?xml version="1.0" encoding="utf-8"?>
+<p:sld xmlns:a="http://schemas.openxmlformats.org/drawingml/2006/main" xmlns:r="http://schemas.openxmlformats.org/officeDocument/2006/relationships" xmlns:p="http://schemas.openxmlformats.org/presentationml/2006/main">
+  <p:cSld>
+    <p:spTree>
+      <p:nvGrpSpPr>
+        <p:cNvPr id="1" name="Shape 252"/>
+        <p:cNvGrpSpPr/>
+        <p:nvPr/>
+      </p:nvGrpSpPr>
+      <p:grpSpPr>
+        <a:xfrm>
+          <a:off x="0" y="0"/>
+          <a:ext cx="0" cy="0"/>
+          <a:chOff x="0" y="0"/>
+          <a:chExt cx="0" cy="0"/>
+        </a:xfrm>
+      </p:grpSpPr>
+      <p:sp>
+        <p:nvSpPr>
+          <p:cNvPr id="253" name="Shape 253"/>
+          <p:cNvSpPr txBox="1">
+            <a:spLocks noGrp="1"/>
+          </p:cNvSpPr>
+          <p:nvPr>
+            <p:ph type="title"/>
+          </p:nvPr>
+        </p:nvSpPr>
+        <p:spPr>
+          <a:xfrm>
+            <a:off x="838200" y="365125"/>
+            <a:ext cx="10515600" cy="1325700"/>
+          </a:xfrm>
+          <a:prstGeom prst="rect">
+            <a:avLst/>
+          </a:prstGeom>
+          <a:noFill/>
+          <a:ln>
+            <a:noFill/>
+          </a:ln>
+        </p:spPr>
+        <p:txBody>
+          <a:bodyPr lIns="91425" tIns="45700" rIns="91425" bIns="45700" anchor="ctr" anchorCtr="0">
+            <a:noAutofit/>
+          </a:bodyPr>
+          <a:lstStyle/>
+          <a:p>
+            <a:pPr marL="0" marR="0" lvl="0" indent="0" algn="l" rtl="0">
+              <a:lnSpc>
+                <a:spcPct val="90000"/>
+              </a:lnSpc>
+              <a:spcBef>
+                <a:spcPts val="0"/>
+              </a:spcBef>
+              <a:buClr>
+                <a:schemeClr val="dk1"/>
+              </a:buClr>
+              <a:buSzPct val="25000"/>
+              <a:buFont typeface="Calibri"/>
+              <a:buNone/>
+            </a:pPr>
+            <a:r>
+              <a:rPr lang="en-US" dirty="0"/>
+              <a:t>TourneyCompactResults.csv Screen Shot</a:t>
+            </a:r>
+          </a:p>
+        </p:txBody>
+      </p:sp>
+      <p:pic>
+        <p:nvPicPr>
+          <p:cNvPr id="254" name="Shape 254"/>
+          <p:cNvPicPr preferRelativeResize="0"/>
+          <p:nvPr/>
+        </p:nvPicPr>
+        <p:blipFill>
+          <a:blip r:embed="rId3">
+            <a:alphaModFix/>
+          </a:blip>
+          <a:stretch>
+            <a:fillRect/>
+          </a:stretch>
+        </p:blipFill>
+        <p:spPr>
+          <a:xfrm>
+            <a:off x="838200" y="1590200"/>
+            <a:ext cx="5832900" cy="5041300"/>
+          </a:xfrm>
+          <a:prstGeom prst="rect">
+            <a:avLst/>
+          </a:prstGeom>
+          <a:noFill/>
+          <a:ln>
+            <a:noFill/>
+          </a:ln>
+        </p:spPr>
+      </p:pic>
+      <p:sp>
+        <p:nvSpPr>
+          <p:cNvPr id="2" name="Slide Number Placeholder 1"/>
+          <p:cNvSpPr>
+            <a:spLocks noGrp="1"/>
+          </p:cNvSpPr>
+          <p:nvPr>
+            <p:ph type="sldNum" idx="12"/>
+          </p:nvPr>
+        </p:nvSpPr>
+        <p:spPr/>
+        <p:txBody>
+          <a:bodyPr/>
+          <a:lstStyle/>
+          <a:p>
+            <a:pPr marL="0" marR="0" lvl="0" indent="0" algn="r" rtl="0">
+              <a:spcBef>
+                <a:spcPts val="0"/>
+              </a:spcBef>
+              <a:buSzPct val="25000"/>
+              <a:buNone/>
+            </a:pPr>
+            <a:fld id="{00000000-1234-1234-1234-123412341234}" type="slidenum">
+              <a:rPr lang="en-US" sz="1200" b="0" i="0" u="none" strike="noStrike" cap="none" smtClean="0">
+                <a:solidFill>
+                  <a:srgbClr val="888888"/>
+                </a:solidFill>
+                <a:latin typeface="Calibri"/>
+                <a:ea typeface="Calibri"/>
+                <a:cs typeface="Calibri"/>
+                <a:sym typeface="Calibri"/>
+              </a:rPr>
+              <a:t>30</a:t>
+            </a:fld>
+            <a:endParaRPr lang="en-US" sz="1200" b="0" i="0" u="none" strike="noStrike" cap="none" dirty="0">
+              <a:solidFill>
+                <a:srgbClr val="888888"/>
+              </a:solidFill>
+              <a:latin typeface="Calibri"/>
+              <a:ea typeface="Calibri"/>
+              <a:cs typeface="Calibri"/>
+              <a:sym typeface="Calibri"/>
+            </a:endParaRPr>
+          </a:p>
+        </p:txBody>
+      </p:sp>
+    </p:spTree>
+  </p:cSld>
+  <p:clrMapOvr>
+    <a:masterClrMapping/>
+  </p:clrMapOvr>
+</p:sld>
+</file>
+
+<file path=ppt/slides/slide31.xml><?xml version="1.0" encoding="utf-8"?>
 <p:sld xmlns:a="http://schemas.openxmlformats.org/drawingml/2006/main" xmlns:r="http://schemas.openxmlformats.org/officeDocument/2006/relationships" xmlns:p="http://schemas.openxmlformats.org/presentationml/2006/main">
   <p:cSld>
     <p:spTree>
@@ -18988,7 +20406,7 @@
                 <a:cs typeface="Calibri"/>
                 <a:sym typeface="Calibri"/>
               </a:rPr>
-              <a:t>30</a:t>
+              <a:t>31</a:t>
             </a:fld>
             <a:endParaRPr lang="en-US" sz="1200" b="0" i="0" u="none" strike="noStrike" cap="none" dirty="0">
               <a:solidFill>
@@ -19010,7 +20428,7 @@
 </p:sld>
 </file>
 
-<file path=ppt/slides/slide31.xml><?xml version="1.0" encoding="utf-8"?>
+<file path=ppt/slides/slide32.xml><?xml version="1.0" encoding="utf-8"?>
 <p:sld xmlns:a="http://schemas.openxmlformats.org/drawingml/2006/main" xmlns:r="http://schemas.openxmlformats.org/officeDocument/2006/relationships" xmlns:p="http://schemas.openxmlformats.org/presentationml/2006/main">
   <p:cSld>
     <p:spTree>
@@ -19186,7 +20604,7 @@
                 <a:cs typeface="Calibri"/>
                 <a:sym typeface="Calibri"/>
               </a:rPr>
-              <a:t>31</a:t>
+              <a:t>32</a:t>
             </a:fld>
             <a:endParaRPr lang="en-US" sz="1200" b="0" i="0" u="none" strike="noStrike" cap="none" dirty="0">
               <a:solidFill>
@@ -19208,7 +20626,7 @@
 </p:sld>
 </file>
 
-<file path=ppt/slides/slide32.xml><?xml version="1.0" encoding="utf-8"?>
+<file path=ppt/slides/slide33.xml><?xml version="1.0" encoding="utf-8"?>
 <p:sld xmlns:a="http://schemas.openxmlformats.org/drawingml/2006/main" xmlns:r="http://schemas.openxmlformats.org/officeDocument/2006/relationships" xmlns:p="http://schemas.openxmlformats.org/presentationml/2006/main">
   <p:cSld>
     <p:spTree>
@@ -19455,7 +20873,7 @@
                 <a:cs typeface="Calibri"/>
                 <a:sym typeface="Calibri"/>
               </a:rPr>
-              <a:t>32</a:t>
+              <a:t>33</a:t>
             </a:fld>
             <a:endParaRPr lang="en-US" sz="1200" b="0" i="0" u="none" strike="noStrike" cap="none" dirty="0">
               <a:solidFill>
@@ -19850,6 +21268,183 @@
   <p:clrMapOvr>
     <a:masterClrMapping/>
   </p:clrMapOvr>
+  <p:timing>
+    <p:tnLst>
+      <p:par>
+        <p:cTn id="1" dur="indefinite" restart="never" nodeType="tmRoot">
+          <p:childTnLst>
+            <p:seq concurrent="1" nextAc="seek">
+              <p:cTn id="2" dur="indefinite" nodeType="mainSeq">
+                <p:childTnLst>
+                  <p:par>
+                    <p:cTn id="3" fill="hold">
+                      <p:stCondLst>
+                        <p:cond delay="indefinite"/>
+                      </p:stCondLst>
+                      <p:childTnLst>
+                        <p:par>
+                          <p:cTn id="4" fill="hold">
+                            <p:stCondLst>
+                              <p:cond delay="0"/>
+                            </p:stCondLst>
+                            <p:childTnLst>
+                              <p:par>
+                                <p:cTn id="5" presetID="1" presetClass="entr" presetSubtype="0" fill="hold" nodeType="clickEffect">
+                                  <p:stCondLst>
+                                    <p:cond delay="0"/>
+                                  </p:stCondLst>
+                                  <p:childTnLst>
+                                    <p:set>
+                                      <p:cBhvr>
+                                        <p:cTn id="6" dur="1" fill="hold">
+                                          <p:stCondLst>
+                                            <p:cond delay="0"/>
+                                          </p:stCondLst>
+                                        </p:cTn>
+                                        <p:tgtEl>
+                                          <p:spTgt spid="102">
+                                            <p:txEl>
+                                              <p:pRg st="1" end="1"/>
+                                            </p:txEl>
+                                          </p:spTgt>
+                                        </p:tgtEl>
+                                        <p:attrNameLst>
+                                          <p:attrName>style.visibility</p:attrName>
+                                        </p:attrNameLst>
+                                      </p:cBhvr>
+                                      <p:to>
+                                        <p:strVal val="visible"/>
+                                      </p:to>
+                                    </p:set>
+                                  </p:childTnLst>
+                                </p:cTn>
+                              </p:par>
+                            </p:childTnLst>
+                          </p:cTn>
+                        </p:par>
+                      </p:childTnLst>
+                    </p:cTn>
+                  </p:par>
+                  <p:par>
+                    <p:cTn id="7" fill="hold">
+                      <p:stCondLst>
+                        <p:cond delay="indefinite"/>
+                      </p:stCondLst>
+                      <p:childTnLst>
+                        <p:par>
+                          <p:cTn id="8" fill="hold">
+                            <p:stCondLst>
+                              <p:cond delay="0"/>
+                            </p:stCondLst>
+                            <p:childTnLst>
+                              <p:par>
+                                <p:cTn id="9" presetID="1" presetClass="entr" presetSubtype="0" fill="hold" nodeType="clickEffect">
+                                  <p:stCondLst>
+                                    <p:cond delay="0"/>
+                                  </p:stCondLst>
+                                  <p:childTnLst>
+                                    <p:set>
+                                      <p:cBhvr>
+                                        <p:cTn id="10" dur="1" fill="hold">
+                                          <p:stCondLst>
+                                            <p:cond delay="0"/>
+                                          </p:stCondLst>
+                                        </p:cTn>
+                                        <p:tgtEl>
+                                          <p:spTgt spid="102">
+                                            <p:txEl>
+                                              <p:pRg st="2" end="2"/>
+                                            </p:txEl>
+                                          </p:spTgt>
+                                        </p:tgtEl>
+                                        <p:attrNameLst>
+                                          <p:attrName>style.visibility</p:attrName>
+                                        </p:attrNameLst>
+                                      </p:cBhvr>
+                                      <p:to>
+                                        <p:strVal val="visible"/>
+                                      </p:to>
+                                    </p:set>
+                                  </p:childTnLst>
+                                </p:cTn>
+                              </p:par>
+                            </p:childTnLst>
+                          </p:cTn>
+                        </p:par>
+                      </p:childTnLst>
+                    </p:cTn>
+                  </p:par>
+                  <p:par>
+                    <p:cTn id="11" fill="hold">
+                      <p:stCondLst>
+                        <p:cond delay="indefinite"/>
+                      </p:stCondLst>
+                      <p:childTnLst>
+                        <p:par>
+                          <p:cTn id="12" fill="hold">
+                            <p:stCondLst>
+                              <p:cond delay="0"/>
+                            </p:stCondLst>
+                            <p:childTnLst>
+                              <p:par>
+                                <p:cTn id="13" presetID="1" presetClass="entr" presetSubtype="0" fill="hold" nodeType="clickEffect">
+                                  <p:stCondLst>
+                                    <p:cond delay="0"/>
+                                  </p:stCondLst>
+                                  <p:childTnLst>
+                                    <p:set>
+                                      <p:cBhvr>
+                                        <p:cTn id="14" dur="1" fill="hold">
+                                          <p:stCondLst>
+                                            <p:cond delay="0"/>
+                                          </p:stCondLst>
+                                        </p:cTn>
+                                        <p:tgtEl>
+                                          <p:spTgt spid="102">
+                                            <p:txEl>
+                                              <p:pRg st="3" end="3"/>
+                                            </p:txEl>
+                                          </p:spTgt>
+                                        </p:tgtEl>
+                                        <p:attrNameLst>
+                                          <p:attrName>style.visibility</p:attrName>
+                                        </p:attrNameLst>
+                                      </p:cBhvr>
+                                      <p:to>
+                                        <p:strVal val="visible"/>
+                                      </p:to>
+                                    </p:set>
+                                  </p:childTnLst>
+                                </p:cTn>
+                              </p:par>
+                            </p:childTnLst>
+                          </p:cTn>
+                        </p:par>
+                      </p:childTnLst>
+                    </p:cTn>
+                  </p:par>
+                </p:childTnLst>
+              </p:cTn>
+              <p:prevCondLst>
+                <p:cond evt="onPrev" delay="0">
+                  <p:tgtEl>
+                    <p:sldTgt/>
+                  </p:tgtEl>
+                </p:cond>
+              </p:prevCondLst>
+              <p:nextCondLst>
+                <p:cond evt="onNext" delay="0">
+                  <p:tgtEl>
+                    <p:sldTgt/>
+                  </p:tgtEl>
+                </p:cond>
+              </p:nextCondLst>
+            </p:seq>
+          </p:childTnLst>
+        </p:cTn>
+      </p:par>
+    </p:tnLst>
+  </p:timing>
 </p:sld>
 </file>
 
@@ -20118,9 +21713,12 @@
             </a:r>
           </a:p>
           <a:p>
-            <a:pPr lvl="1" rtl="0">
-              <a:spcBef>
-                <a:spcPts val="0"/>
+            <a:pPr marL="685800" marR="0" lvl="1" indent="-228600" algn="l" rtl="0">
+              <a:lnSpc>
+                <a:spcPct val="90000"/>
+              </a:lnSpc>
+              <a:spcBef>
+                <a:spcPts val="500"/>
               </a:spcBef>
               <a:buClr>
                 <a:schemeClr val="dk1"/>
@@ -20130,28 +21728,12 @@
               <a:buChar char="•"/>
             </a:pPr>
             <a:r>
-              <a:rPr lang="en-US" dirty="0"/>
-              <a:t>Bagging Classifier </a:t>
+              <a:rPr lang="en-US" dirty="0" smtClean="0"/>
+              <a:t>Support </a:t>
             </a:r>
-          </a:p>
-          <a:p>
-            <a:pPr marL="685800" marR="0" lvl="1" indent="-228600" algn="l" rtl="0">
-              <a:lnSpc>
-                <a:spcPct val="90000"/>
-              </a:lnSpc>
-              <a:spcBef>
-                <a:spcPts val="500"/>
-              </a:spcBef>
-              <a:buClr>
-                <a:schemeClr val="dk1"/>
-              </a:buClr>
-              <a:buSzPct val="100000"/>
-              <a:buFont typeface="Arial"/>
-              <a:buChar char="•"/>
-            </a:pPr>
             <a:r>
               <a:rPr lang="en-US" dirty="0"/>
-              <a:t>Support Vector Machine (not successful)</a:t>
+              <a:t>Vector Machine (not successful)</a:t>
             </a:r>
           </a:p>
         </p:txBody>
@@ -20207,6 +21789,240 @@
   <p:clrMapOvr>
     <a:masterClrMapping/>
   </p:clrMapOvr>
+  <p:timing>
+    <p:tnLst>
+      <p:par>
+        <p:cTn id="1" dur="indefinite" restart="never" nodeType="tmRoot">
+          <p:childTnLst>
+            <p:seq concurrent="1" nextAc="seek">
+              <p:cTn id="2" dur="indefinite" nodeType="mainSeq">
+                <p:childTnLst>
+                  <p:par>
+                    <p:cTn id="3" fill="hold">
+                      <p:stCondLst>
+                        <p:cond delay="indefinite"/>
+                      </p:stCondLst>
+                      <p:childTnLst>
+                        <p:par>
+                          <p:cTn id="4" fill="hold">
+                            <p:stCondLst>
+                              <p:cond delay="0"/>
+                            </p:stCondLst>
+                            <p:childTnLst>
+                              <p:par>
+                                <p:cTn id="5" presetID="1" presetClass="entr" presetSubtype="0" fill="hold" nodeType="clickEffect">
+                                  <p:stCondLst>
+                                    <p:cond delay="0"/>
+                                  </p:stCondLst>
+                                  <p:childTnLst>
+                                    <p:set>
+                                      <p:cBhvr>
+                                        <p:cTn id="6" dur="1" fill="hold">
+                                          <p:stCondLst>
+                                            <p:cond delay="0"/>
+                                          </p:stCondLst>
+                                        </p:cTn>
+                                        <p:tgtEl>
+                                          <p:spTgt spid="108">
+                                            <p:txEl>
+                                              <p:pRg st="1" end="1"/>
+                                            </p:txEl>
+                                          </p:spTgt>
+                                        </p:tgtEl>
+                                        <p:attrNameLst>
+                                          <p:attrName>style.visibility</p:attrName>
+                                        </p:attrNameLst>
+                                      </p:cBhvr>
+                                      <p:to>
+                                        <p:strVal val="visible"/>
+                                      </p:to>
+                                    </p:set>
+                                  </p:childTnLst>
+                                </p:cTn>
+                              </p:par>
+                              <p:par>
+                                <p:cTn id="7" presetID="1" presetClass="entr" presetSubtype="0" fill="hold" nodeType="withEffect">
+                                  <p:stCondLst>
+                                    <p:cond delay="0"/>
+                                  </p:stCondLst>
+                                  <p:childTnLst>
+                                    <p:set>
+                                      <p:cBhvr>
+                                        <p:cTn id="8" dur="1" fill="hold">
+                                          <p:stCondLst>
+                                            <p:cond delay="0"/>
+                                          </p:stCondLst>
+                                        </p:cTn>
+                                        <p:tgtEl>
+                                          <p:spTgt spid="108">
+                                            <p:txEl>
+                                              <p:pRg st="2" end="2"/>
+                                            </p:txEl>
+                                          </p:spTgt>
+                                        </p:tgtEl>
+                                        <p:attrNameLst>
+                                          <p:attrName>style.visibility</p:attrName>
+                                        </p:attrNameLst>
+                                      </p:cBhvr>
+                                      <p:to>
+                                        <p:strVal val="visible"/>
+                                      </p:to>
+                                    </p:set>
+                                  </p:childTnLst>
+                                </p:cTn>
+                              </p:par>
+                              <p:par>
+                                <p:cTn id="9" presetID="1" presetClass="entr" presetSubtype="0" fill="hold" nodeType="withEffect">
+                                  <p:stCondLst>
+                                    <p:cond delay="0"/>
+                                  </p:stCondLst>
+                                  <p:childTnLst>
+                                    <p:set>
+                                      <p:cBhvr>
+                                        <p:cTn id="10" dur="1" fill="hold">
+                                          <p:stCondLst>
+                                            <p:cond delay="0"/>
+                                          </p:stCondLst>
+                                        </p:cTn>
+                                        <p:tgtEl>
+                                          <p:spTgt spid="108">
+                                            <p:txEl>
+                                              <p:pRg st="3" end="3"/>
+                                            </p:txEl>
+                                          </p:spTgt>
+                                        </p:tgtEl>
+                                        <p:attrNameLst>
+                                          <p:attrName>style.visibility</p:attrName>
+                                        </p:attrNameLst>
+                                      </p:cBhvr>
+                                      <p:to>
+                                        <p:strVal val="visible"/>
+                                      </p:to>
+                                    </p:set>
+                                  </p:childTnLst>
+                                </p:cTn>
+                              </p:par>
+                              <p:par>
+                                <p:cTn id="11" presetID="1" presetClass="entr" presetSubtype="0" fill="hold" nodeType="withEffect">
+                                  <p:stCondLst>
+                                    <p:cond delay="0"/>
+                                  </p:stCondLst>
+                                  <p:childTnLst>
+                                    <p:set>
+                                      <p:cBhvr>
+                                        <p:cTn id="12" dur="1" fill="hold">
+                                          <p:stCondLst>
+                                            <p:cond delay="0"/>
+                                          </p:stCondLst>
+                                        </p:cTn>
+                                        <p:tgtEl>
+                                          <p:spTgt spid="108">
+                                            <p:txEl>
+                                              <p:pRg st="4" end="4"/>
+                                            </p:txEl>
+                                          </p:spTgt>
+                                        </p:tgtEl>
+                                        <p:attrNameLst>
+                                          <p:attrName>style.visibility</p:attrName>
+                                        </p:attrNameLst>
+                                      </p:cBhvr>
+                                      <p:to>
+                                        <p:strVal val="visible"/>
+                                      </p:to>
+                                    </p:set>
+                                  </p:childTnLst>
+                                </p:cTn>
+                              </p:par>
+                              <p:par>
+                                <p:cTn id="13" presetID="1" presetClass="entr" presetSubtype="0" fill="hold" nodeType="withEffect">
+                                  <p:stCondLst>
+                                    <p:cond delay="0"/>
+                                  </p:stCondLst>
+                                  <p:childTnLst>
+                                    <p:set>
+                                      <p:cBhvr>
+                                        <p:cTn id="14" dur="1" fill="hold">
+                                          <p:stCondLst>
+                                            <p:cond delay="0"/>
+                                          </p:stCondLst>
+                                        </p:cTn>
+                                        <p:tgtEl>
+                                          <p:spTgt spid="108">
+                                            <p:txEl>
+                                              <p:pRg st="5" end="5"/>
+                                            </p:txEl>
+                                          </p:spTgt>
+                                        </p:tgtEl>
+                                        <p:attrNameLst>
+                                          <p:attrName>style.visibility</p:attrName>
+                                        </p:attrNameLst>
+                                      </p:cBhvr>
+                                      <p:to>
+                                        <p:strVal val="visible"/>
+                                      </p:to>
+                                    </p:set>
+                                  </p:childTnLst>
+                                </p:cTn>
+                              </p:par>
+                              <p:par>
+                                <p:cTn id="15" presetID="1" presetClass="entr" presetSubtype="0" fill="hold" nodeType="withEffect">
+                                  <p:stCondLst>
+                                    <p:cond delay="0"/>
+                                  </p:stCondLst>
+                                  <p:childTnLst>
+                                    <p:set>
+                                      <p:cBhvr>
+                                        <p:cTn id="16" dur="1" fill="hold">
+                                          <p:stCondLst>
+                                            <p:cond delay="0"/>
+                                          </p:stCondLst>
+                                        </p:cTn>
+                                        <p:tgtEl>
+                                          <p:spTgt spid="108">
+                                            <p:txEl>
+                                              <p:pRg st="6" end="6"/>
+                                            </p:txEl>
+                                          </p:spTgt>
+                                        </p:tgtEl>
+                                        <p:attrNameLst>
+                                          <p:attrName>style.visibility</p:attrName>
+                                        </p:attrNameLst>
+                                      </p:cBhvr>
+                                      <p:to>
+                                        <p:strVal val="visible"/>
+                                      </p:to>
+                                    </p:set>
+                                  </p:childTnLst>
+                                </p:cTn>
+                              </p:par>
+                            </p:childTnLst>
+                          </p:cTn>
+                        </p:par>
+                      </p:childTnLst>
+                    </p:cTn>
+                  </p:par>
+                </p:childTnLst>
+              </p:cTn>
+              <p:prevCondLst>
+                <p:cond evt="onPrev" delay="0">
+                  <p:tgtEl>
+                    <p:sldTgt/>
+                  </p:tgtEl>
+                </p:cond>
+              </p:prevCondLst>
+              <p:nextCondLst>
+                <p:cond evt="onNext" delay="0">
+                  <p:tgtEl>
+                    <p:sldTgt/>
+                  </p:tgtEl>
+                </p:cond>
+              </p:nextCondLst>
+            </p:seq>
+          </p:childTnLst>
+        </p:cTn>
+      </p:par>
+    </p:tnLst>
+  </p:timing>
 </p:sld>
 </file>
 
@@ -20542,6 +22358,13 @@
   <p:clrMapOvr>
     <a:masterClrMapping/>
   </p:clrMapOvr>
+  <p:timing>
+    <p:tnLst>
+      <p:par>
+        <p:cTn id="1" dur="indefinite" restart="never" nodeType="tmRoot"/>
+      </p:par>
+    </p:tnLst>
+  </p:timing>
 </p:sld>
 </file>
 
@@ -20691,6 +22514,13 @@
   <p:clrMapOvr>
     <a:masterClrMapping/>
   </p:clrMapOvr>
+  <p:timing>
+    <p:tnLst>
+      <p:par>
+        <p:cTn id="1" dur="indefinite" restart="never" nodeType="tmRoot"/>
+      </p:par>
+    </p:tnLst>
+  </p:timing>
 </p:sld>
 </file>
 
@@ -20809,8 +22639,25 @@
             </a:pPr>
             <a:r>
               <a:rPr lang="en-US" dirty="0"/>
-              <a:t>“When working on a machine learning problem, feature engineering is manually designing what the input x's should be.”  - Shayne Miel, “What is the intuitive explanation of feature engineering in machine learning?”</a:t>
+              <a:t>“When working on a machine learning problem, feature engineering is manually designing what the input x's should be.”  - Shayne Miel, </a:t>
             </a:r>
+            <a:r>
+              <a:rPr lang="en-US" sz="2000" dirty="0" smtClean="0"/>
+              <a:t>(author of “</a:t>
+            </a:r>
+            <a:r>
+              <a:rPr lang="en-US" sz="2000" i="1" dirty="0" smtClean="0"/>
+              <a:t>What </a:t>
+            </a:r>
+            <a:r>
+              <a:rPr lang="en-US" sz="2000" i="1" dirty="0"/>
+              <a:t>is the intuitive explanation of feature engineering in machine learning</a:t>
+            </a:r>
+            <a:r>
+              <a:rPr lang="en-US" sz="2000" dirty="0" smtClean="0"/>
+              <a:t>?”)</a:t>
+            </a:r>
+            <a:endParaRPr lang="en-US" sz="2000" dirty="0"/>
           </a:p>
           <a:p>
             <a:pPr marL="0" marR="0" lvl="0" indent="0" algn="l" rtl="0">
@@ -20944,6 +22791,134 @@
   <p:clrMapOvr>
     <a:masterClrMapping/>
   </p:clrMapOvr>
+  <p:timing>
+    <p:tnLst>
+      <p:par>
+        <p:cTn id="1" dur="indefinite" restart="never" nodeType="tmRoot">
+          <p:childTnLst>
+            <p:seq concurrent="1" nextAc="seek">
+              <p:cTn id="2" dur="indefinite" nodeType="mainSeq">
+                <p:childTnLst>
+                  <p:par>
+                    <p:cTn id="3" fill="hold">
+                      <p:stCondLst>
+                        <p:cond delay="indefinite"/>
+                      </p:stCondLst>
+                      <p:childTnLst>
+                        <p:par>
+                          <p:cTn id="4" fill="hold">
+                            <p:stCondLst>
+                              <p:cond delay="0"/>
+                            </p:stCondLst>
+                            <p:childTnLst>
+                              <p:par>
+                                <p:cTn id="5" presetID="1" presetClass="entr" presetSubtype="0" fill="hold" nodeType="clickEffect">
+                                  <p:stCondLst>
+                                    <p:cond delay="0"/>
+                                  </p:stCondLst>
+                                  <p:childTnLst>
+                                    <p:set>
+                                      <p:cBhvr>
+                                        <p:cTn id="6" dur="1" fill="hold">
+                                          <p:stCondLst>
+                                            <p:cond delay="0"/>
+                                          </p:stCondLst>
+                                        </p:cTn>
+                                        <p:tgtEl>
+                                          <p:spTgt spid="126">
+                                            <p:txEl>
+                                              <p:pRg st="2" end="2"/>
+                                            </p:txEl>
+                                          </p:spTgt>
+                                        </p:tgtEl>
+                                        <p:attrNameLst>
+                                          <p:attrName>style.visibility</p:attrName>
+                                        </p:attrNameLst>
+                                      </p:cBhvr>
+                                      <p:to>
+                                        <p:strVal val="visible"/>
+                                      </p:to>
+                                    </p:set>
+                                  </p:childTnLst>
+                                </p:cTn>
+                              </p:par>
+                            </p:childTnLst>
+                          </p:cTn>
+                        </p:par>
+                      </p:childTnLst>
+                    </p:cTn>
+                  </p:par>
+                  <p:par>
+                    <p:cTn id="7" fill="hold">
+                      <p:stCondLst>
+                        <p:cond delay="indefinite"/>
+                      </p:stCondLst>
+                      <p:childTnLst>
+                        <p:par>
+                          <p:cTn id="8" fill="hold">
+                            <p:stCondLst>
+                              <p:cond delay="0"/>
+                            </p:stCondLst>
+                            <p:childTnLst>
+                              <p:par>
+                                <p:cTn id="9" presetID="1" presetClass="entr" presetSubtype="0" fill="hold" nodeType="clickEffect">
+                                  <p:stCondLst>
+                                    <p:cond delay="0"/>
+                                  </p:stCondLst>
+                                  <p:childTnLst>
+                                    <p:set>
+                                      <p:cBhvr>
+                                        <p:cTn id="10" dur="1" fill="hold">
+                                          <p:stCondLst>
+                                            <p:cond delay="0"/>
+                                          </p:stCondLst>
+                                        </p:cTn>
+                                        <p:tgtEl>
+                                          <p:spTgt spid="126">
+                                            <p:txEl>
+                                              <p:pRg st="4" end="4"/>
+                                            </p:txEl>
+                                          </p:spTgt>
+                                        </p:tgtEl>
+                                        <p:attrNameLst>
+                                          <p:attrName>style.visibility</p:attrName>
+                                        </p:attrNameLst>
+                                      </p:cBhvr>
+                                      <p:to>
+                                        <p:strVal val="visible"/>
+                                      </p:to>
+                                    </p:set>
+                                  </p:childTnLst>
+                                </p:cTn>
+                              </p:par>
+                            </p:childTnLst>
+                          </p:cTn>
+                        </p:par>
+                      </p:childTnLst>
+                    </p:cTn>
+                  </p:par>
+                </p:childTnLst>
+              </p:cTn>
+              <p:prevCondLst>
+                <p:cond evt="onPrev" delay="0">
+                  <p:tgtEl>
+                    <p:sldTgt/>
+                  </p:tgtEl>
+                </p:cond>
+              </p:prevCondLst>
+              <p:nextCondLst>
+                <p:cond evt="onNext" delay="0">
+                  <p:tgtEl>
+                    <p:sldTgt/>
+                  </p:tgtEl>
+                </p:cond>
+              </p:nextCondLst>
+            </p:seq>
+          </p:childTnLst>
+        </p:cTn>
+      </p:par>
+    </p:tnLst>
+  </p:timing>
 </p:sld>
 </file>
 
@@ -21085,8 +23060,32 @@
             </a:pPr>
             <a:r>
               <a:rPr lang="en-US" dirty="0"/>
-              <a:t>Difference between the seed of the winning team and the seed of the losing team</a:t>
+              <a:t>Difference between the seed of the winning team and the seed of the losing </a:t>
             </a:r>
+            <a:r>
+              <a:rPr lang="en-US" dirty="0" smtClean="0"/>
+              <a:t>team</a:t>
+            </a:r>
+          </a:p>
+          <a:p>
+            <a:pPr marR="0" lvl="1" algn="l" rtl="0">
+              <a:lnSpc>
+                <a:spcPct val="90000"/>
+              </a:lnSpc>
+              <a:spcBef>
+                <a:spcPts val="0"/>
+              </a:spcBef>
+              <a:spcAft>
+                <a:spcPts val="0"/>
+              </a:spcAft>
+              <a:buClr>
+                <a:schemeClr val="dk1"/>
+              </a:buClr>
+              <a:buSzPct val="100000"/>
+              <a:buFont typeface="Arial"/>
+              <a:buChar char="•"/>
+            </a:pPr>
+            <a:endParaRPr lang="en-US" dirty="0"/>
           </a:p>
           <a:p>
             <a:pPr marL="228600" marR="0" lvl="0" indent="-228600" algn="l" rtl="0">
@@ -21195,6 +23194,116 @@
   <p:clrMapOvr>
     <a:masterClrMapping/>
   </p:clrMapOvr>
+  <p:timing>
+    <p:tnLst>
+      <p:par>
+        <p:cTn id="1" dur="indefinite" restart="never" nodeType="tmRoot">
+          <p:childTnLst>
+            <p:seq concurrent="1" nextAc="seek">
+              <p:cTn id="2" dur="indefinite" nodeType="mainSeq">
+                <p:childTnLst>
+                  <p:par>
+                    <p:cTn id="3" fill="hold">
+                      <p:stCondLst>
+                        <p:cond delay="indefinite"/>
+                      </p:stCondLst>
+                      <p:childTnLst>
+                        <p:par>
+                          <p:cTn id="4" fill="hold">
+                            <p:stCondLst>
+                              <p:cond delay="0"/>
+                            </p:stCondLst>
+                            <p:childTnLst>
+                              <p:par>
+                                <p:cTn id="5" presetID="1" presetClass="entr" presetSubtype="0" fill="hold" nodeType="clickEffect">
+                                  <p:stCondLst>
+                                    <p:cond delay="0"/>
+                                  </p:stCondLst>
+                                  <p:childTnLst>
+                                    <p:set>
+                                      <p:cBhvr>
+                                        <p:cTn id="6" dur="1" fill="hold">
+                                          <p:stCondLst>
+                                            <p:cond delay="0"/>
+                                          </p:stCondLst>
+                                        </p:cTn>
+                                        <p:tgtEl>
+                                          <p:spTgt spid="132">
+                                            <p:txEl>
+                                              <p:pRg st="3" end="3"/>
+                                            </p:txEl>
+                                          </p:spTgt>
+                                        </p:tgtEl>
+                                        <p:attrNameLst>
+                                          <p:attrName>style.visibility</p:attrName>
+                                        </p:attrNameLst>
+                                      </p:cBhvr>
+                                      <p:to>
+                                        <p:strVal val="visible"/>
+                                      </p:to>
+                                    </p:set>
+                                  </p:childTnLst>
+                                </p:cTn>
+                              </p:par>
+                              <p:par>
+                                <p:cTn id="7" presetID="1" presetClass="entr" presetSubtype="0" fill="hold" nodeType="withEffect">
+                                  <p:stCondLst>
+                                    <p:cond delay="0"/>
+                                  </p:stCondLst>
+                                  <p:childTnLst>
+                                    <p:set>
+                                      <p:cBhvr>
+                                        <p:cTn id="8" dur="1" fill="hold">
+                                          <p:stCondLst>
+                                            <p:cond delay="0"/>
+                                          </p:stCondLst>
+                                        </p:cTn>
+                                        <p:tgtEl>
+                                          <p:spTgt spid="132">
+                                            <p:txEl>
+                                              <p:pRg st="4" end="4"/>
+                                            </p:txEl>
+                                          </p:spTgt>
+                                        </p:tgtEl>
+                                        <p:attrNameLst>
+                                          <p:attrName>style.visibility</p:attrName>
+                                        </p:attrNameLst>
+                                      </p:cBhvr>
+                                      <p:to>
+                                        <p:strVal val="visible"/>
+                                      </p:to>
+                                    </p:set>
+                                  </p:childTnLst>
+                                </p:cTn>
+                              </p:par>
+                            </p:childTnLst>
+                          </p:cTn>
+                        </p:par>
+                      </p:childTnLst>
+                    </p:cTn>
+                  </p:par>
+                </p:childTnLst>
+              </p:cTn>
+              <p:prevCondLst>
+                <p:cond evt="onPrev" delay="0">
+                  <p:tgtEl>
+                    <p:sldTgt/>
+                  </p:tgtEl>
+                </p:cond>
+              </p:prevCondLst>
+              <p:nextCondLst>
+                <p:cond evt="onNext" delay="0">
+                  <p:tgtEl>
+                    <p:sldTgt/>
+                  </p:tgtEl>
+                </p:cond>
+              </p:nextCondLst>
+            </p:seq>
+          </p:childTnLst>
+        </p:cTn>
+      </p:par>
+    </p:tnLst>
+  </p:timing>
 </p:sld>
 </file>
 

</xml_diff>